<commit_message>
Final fixes before pushing scripts
</commit_message>
<xml_diff>
--- a/ILoveDBATools/ILoveDBATools.pptx
+++ b/ILoveDBATools/ILoveDBATools.pptx
@@ -6,7 +6,7 @@
     <p:sldMasterId id="2147483668" r:id="rId5"/>
   </p:sldMasterIdLst>
   <p:notesMasterIdLst>
-    <p:notesMasterId r:id="rId24"/>
+    <p:notesMasterId r:id="rId18"/>
   </p:notesMasterIdLst>
   <p:sldIdLst>
     <p:sldId id="260" r:id="rId6"/>
@@ -17,16 +17,10 @@
     <p:sldId id="269" r:id="rId11"/>
     <p:sldId id="270" r:id="rId12"/>
     <p:sldId id="285" r:id="rId13"/>
-    <p:sldId id="280" r:id="rId14"/>
-    <p:sldId id="284" r:id="rId15"/>
-    <p:sldId id="272" r:id="rId16"/>
-    <p:sldId id="279" r:id="rId17"/>
-    <p:sldId id="275" r:id="rId18"/>
-    <p:sldId id="276" r:id="rId19"/>
-    <p:sldId id="277" r:id="rId20"/>
-    <p:sldId id="278" r:id="rId21"/>
-    <p:sldId id="281" r:id="rId22"/>
-    <p:sldId id="282" r:id="rId23"/>
+    <p:sldId id="289" r:id="rId14"/>
+    <p:sldId id="291" r:id="rId15"/>
+    <p:sldId id="287" r:id="rId16"/>
+    <p:sldId id="292" r:id="rId17"/>
   </p:sldIdLst>
   <p:sldSz cx="12192000" cy="6858000"/>
   <p:notesSz cx="6858000" cy="9144000"/>
@@ -143,6 +137,451 @@
 
 <file path=ppt/changesInfos/changesInfo1.xml><?xml version="1.0" encoding="utf-8"?>
 <pc:chgInfo xmlns:a="http://schemas.openxmlformats.org/drawingml/2006/main" xmlns:r="http://schemas.openxmlformats.org/officeDocument/2006/relationships" xmlns:ac="http://schemas.microsoft.com/office/drawing/2013/main/command" xmlns:pc="http://schemas.microsoft.com/office/powerpoint/2013/main/command">
+  <pc:docChgLst>
+    <pc:chgData name="Magnus Ahlkvist" userId="ada356d894bd2de7" providerId="LiveId" clId="{07E3E307-9A68-4597-B735-5F5EBF997CF0}"/>
+    <pc:docChg chg="modSld">
+      <pc:chgData name="Magnus Ahlkvist" userId="ada356d894bd2de7" providerId="LiveId" clId="{07E3E307-9A68-4597-B735-5F5EBF997CF0}" dt="2019-11-13T05:58:18.829" v="9" actId="1076"/>
+      <pc:docMkLst>
+        <pc:docMk/>
+      </pc:docMkLst>
+      <pc:sldChg chg="addSp modSp">
+        <pc:chgData name="Magnus Ahlkvist" userId="ada356d894bd2de7" providerId="LiveId" clId="{07E3E307-9A68-4597-B735-5F5EBF997CF0}" dt="2019-11-13T05:58:18.829" v="9" actId="1076"/>
+        <pc:sldMkLst>
+          <pc:docMk/>
+          <pc:sldMk cId="1847188119" sldId="260"/>
+        </pc:sldMkLst>
+        <pc:picChg chg="add mod modCrop">
+          <ac:chgData name="Magnus Ahlkvist" userId="ada356d894bd2de7" providerId="LiveId" clId="{07E3E307-9A68-4597-B735-5F5EBF997CF0}" dt="2019-11-13T05:58:18.829" v="9" actId="1076"/>
+          <ac:picMkLst>
+            <pc:docMk/>
+            <pc:sldMk cId="1847188119" sldId="260"/>
+            <ac:picMk id="5" creationId="{099A75BC-ED83-4232-8CE1-447DBDA9BC2E}"/>
+          </ac:picMkLst>
+        </pc:picChg>
+      </pc:sldChg>
+    </pc:docChg>
+  </pc:docChgLst>
+  <pc:docChgLst>
+    <pc:chgData name="Magnus Ahlkvist" userId="ada356d894bd2de7" providerId="LiveId" clId="{1A8E3A2A-DA26-4BD2-A1EB-5BAE0A274B92}"/>
+    <pc:docChg chg="addSld modSld">
+      <pc:chgData name="Magnus Ahlkvist" userId="ada356d894bd2de7" providerId="LiveId" clId="{1A8E3A2A-DA26-4BD2-A1EB-5BAE0A274B92}" dt="2019-10-13T10:28:43.466" v="263" actId="20577"/>
+      <pc:docMkLst>
+        <pc:docMk/>
+      </pc:docMkLst>
+      <pc:sldChg chg="modSp modAnim">
+        <pc:chgData name="Magnus Ahlkvist" userId="ada356d894bd2de7" providerId="LiveId" clId="{1A8E3A2A-DA26-4BD2-A1EB-5BAE0A274B92}" dt="2019-10-13T08:49:51.700" v="210" actId="20577"/>
+        <pc:sldMkLst>
+          <pc:docMk/>
+          <pc:sldMk cId="6683241" sldId="257"/>
+        </pc:sldMkLst>
+        <pc:spChg chg="mod">
+          <ac:chgData name="Magnus Ahlkvist" userId="ada356d894bd2de7" providerId="LiveId" clId="{1A8E3A2A-DA26-4BD2-A1EB-5BAE0A274B92}" dt="2019-10-13T08:47:48.033" v="59" actId="20577"/>
+          <ac:spMkLst>
+            <pc:docMk/>
+            <pc:sldMk cId="6683241" sldId="257"/>
+            <ac:spMk id="2" creationId="{00000000-0000-0000-0000-000000000000}"/>
+          </ac:spMkLst>
+        </pc:spChg>
+        <pc:spChg chg="mod">
+          <ac:chgData name="Magnus Ahlkvist" userId="ada356d894bd2de7" providerId="LiveId" clId="{1A8E3A2A-DA26-4BD2-A1EB-5BAE0A274B92}" dt="2019-10-13T08:49:51.700" v="210" actId="20577"/>
+          <ac:spMkLst>
+            <pc:docMk/>
+            <pc:sldMk cId="6683241" sldId="257"/>
+            <ac:spMk id="3" creationId="{00000000-0000-0000-0000-000000000000}"/>
+          </ac:spMkLst>
+        </pc:spChg>
+      </pc:sldChg>
+      <pc:sldChg chg="modSp">
+        <pc:chgData name="Magnus Ahlkvist" userId="ada356d894bd2de7" providerId="LiveId" clId="{1A8E3A2A-DA26-4BD2-A1EB-5BAE0A274B92}" dt="2019-10-13T08:47:38.171" v="52" actId="20577"/>
+        <pc:sldMkLst>
+          <pc:docMk/>
+          <pc:sldMk cId="1847188119" sldId="260"/>
+        </pc:sldMkLst>
+        <pc:spChg chg="mod">
+          <ac:chgData name="Magnus Ahlkvist" userId="ada356d894bd2de7" providerId="LiveId" clId="{1A8E3A2A-DA26-4BD2-A1EB-5BAE0A274B92}" dt="2019-10-13T08:47:30.985" v="37" actId="20577"/>
+          <ac:spMkLst>
+            <pc:docMk/>
+            <pc:sldMk cId="1847188119" sldId="260"/>
+            <ac:spMk id="2" creationId="{3A9EEC31-E066-4E62-BAAB-C170893FFE25}"/>
+          </ac:spMkLst>
+        </pc:spChg>
+        <pc:spChg chg="mod">
+          <ac:chgData name="Magnus Ahlkvist" userId="ada356d894bd2de7" providerId="LiveId" clId="{1A8E3A2A-DA26-4BD2-A1EB-5BAE0A274B92}" dt="2019-10-13T08:47:38.171" v="52" actId="20577"/>
+          <ac:spMkLst>
+            <pc:docMk/>
+            <pc:sldMk cId="1847188119" sldId="260"/>
+            <ac:spMk id="3" creationId="{FB9B0E28-205D-4B8D-B72F-75D77CF2161D}"/>
+          </ac:spMkLst>
+        </pc:spChg>
+      </pc:sldChg>
+      <pc:sldChg chg="modSp add">
+        <pc:chgData name="Magnus Ahlkvist" userId="ada356d894bd2de7" providerId="LiveId" clId="{1A8E3A2A-DA26-4BD2-A1EB-5BAE0A274B92}" dt="2019-10-13T10:28:43.466" v="263" actId="20577"/>
+        <pc:sldMkLst>
+          <pc:docMk/>
+          <pc:sldMk cId="7591363" sldId="261"/>
+        </pc:sldMkLst>
+        <pc:spChg chg="mod">
+          <ac:chgData name="Magnus Ahlkvist" userId="ada356d894bd2de7" providerId="LiveId" clId="{1A8E3A2A-DA26-4BD2-A1EB-5BAE0A274B92}" dt="2019-10-13T10:28:29.377" v="227" actId="20577"/>
+          <ac:spMkLst>
+            <pc:docMk/>
+            <pc:sldMk cId="7591363" sldId="261"/>
+            <ac:spMk id="2" creationId="{70C438DB-20F7-4B34-8E2C-4BF45E7293A3}"/>
+          </ac:spMkLst>
+        </pc:spChg>
+        <pc:spChg chg="mod">
+          <ac:chgData name="Magnus Ahlkvist" userId="ada356d894bd2de7" providerId="LiveId" clId="{1A8E3A2A-DA26-4BD2-A1EB-5BAE0A274B92}" dt="2019-10-13T10:28:43.466" v="263" actId="20577"/>
+          <ac:spMkLst>
+            <pc:docMk/>
+            <pc:sldMk cId="7591363" sldId="261"/>
+            <ac:spMk id="3" creationId="{3308BB25-8932-48AF-AEB6-FF932D5D492F}"/>
+          </ac:spMkLst>
+        </pc:spChg>
+      </pc:sldChg>
+    </pc:docChg>
+  </pc:docChgLst>
+  <pc:docChgLst>
+    <pc:chgData name="Magnus Ahlkvist" userId="ada356d894bd2de7" providerId="LiveId" clId="{AE30E77A-B034-4EFF-9C84-45F53A6DE982}"/>
+    <pc:docChg chg="undo redo custSel mod addSld delSld modSld">
+      <pc:chgData name="Magnus Ahlkvist" userId="ada356d894bd2de7" providerId="LiveId" clId="{AE30E77A-B034-4EFF-9C84-45F53A6DE982}" dt="2020-04-06T20:49:07.114" v="1353" actId="6549"/>
+      <pc:docMkLst>
+        <pc:docMk/>
+      </pc:docMkLst>
+      <pc:sldChg chg="addSp modSp mod">
+        <pc:chgData name="Magnus Ahlkvist" userId="ada356d894bd2de7" providerId="LiveId" clId="{AE30E77A-B034-4EFF-9C84-45F53A6DE982}" dt="2020-04-06T20:48:35.224" v="1352" actId="20577"/>
+        <pc:sldMkLst>
+          <pc:docMk/>
+          <pc:sldMk cId="6683241" sldId="257"/>
+        </pc:sldMkLst>
+        <pc:spChg chg="mod">
+          <ac:chgData name="Magnus Ahlkvist" userId="ada356d894bd2de7" providerId="LiveId" clId="{AE30E77A-B034-4EFF-9C84-45F53A6DE982}" dt="2020-04-06T20:48:35.224" v="1352" actId="20577"/>
+          <ac:spMkLst>
+            <pc:docMk/>
+            <pc:sldMk cId="6683241" sldId="257"/>
+            <ac:spMk id="3" creationId="{00000000-0000-0000-0000-000000000000}"/>
+          </ac:spMkLst>
+        </pc:spChg>
+        <pc:spChg chg="add mod">
+          <ac:chgData name="Magnus Ahlkvist" userId="ada356d894bd2de7" providerId="LiveId" clId="{AE30E77A-B034-4EFF-9C84-45F53A6DE982}" dt="2020-04-06T20:48:17.761" v="1323" actId="1076"/>
+          <ac:spMkLst>
+            <pc:docMk/>
+            <pc:sldMk cId="6683241" sldId="257"/>
+            <ac:spMk id="6" creationId="{E7DCA6E0-1CB4-4729-9F7F-F2968708EDBE}"/>
+          </ac:spMkLst>
+        </pc:spChg>
+        <pc:picChg chg="add mod">
+          <ac:chgData name="Magnus Ahlkvist" userId="ada356d894bd2de7" providerId="LiveId" clId="{AE30E77A-B034-4EFF-9C84-45F53A6DE982}" dt="2020-04-06T20:48:17.761" v="1323" actId="1076"/>
+          <ac:picMkLst>
+            <pc:docMk/>
+            <pc:sldMk cId="6683241" sldId="257"/>
+            <ac:picMk id="5" creationId="{1268A56F-28EF-4F25-A019-10D5AD3D0098}"/>
+          </ac:picMkLst>
+        </pc:picChg>
+      </pc:sldChg>
+      <pc:sldChg chg="modSp mod modClrScheme chgLayout">
+        <pc:chgData name="Magnus Ahlkvist" userId="ada356d894bd2de7" providerId="LiveId" clId="{AE30E77A-B034-4EFF-9C84-45F53A6DE982}" dt="2020-04-06T20:47:10.118" v="1284" actId="20577"/>
+        <pc:sldMkLst>
+          <pc:docMk/>
+          <pc:sldMk cId="1847188119" sldId="260"/>
+        </pc:sldMkLst>
+        <pc:spChg chg="mod">
+          <ac:chgData name="Magnus Ahlkvist" userId="ada356d894bd2de7" providerId="LiveId" clId="{AE30E77A-B034-4EFF-9C84-45F53A6DE982}" dt="2020-04-06T19:51:44.494" v="73" actId="14100"/>
+          <ac:spMkLst>
+            <pc:docMk/>
+            <pc:sldMk cId="1847188119" sldId="260"/>
+            <ac:spMk id="2" creationId="{3A9EEC31-E066-4E62-BAAB-C170893FFE25}"/>
+          </ac:spMkLst>
+        </pc:spChg>
+        <pc:spChg chg="mod ord">
+          <ac:chgData name="Magnus Ahlkvist" userId="ada356d894bd2de7" providerId="LiveId" clId="{AE30E77A-B034-4EFF-9C84-45F53A6DE982}" dt="2020-04-06T20:47:10.118" v="1284" actId="20577"/>
+          <ac:spMkLst>
+            <pc:docMk/>
+            <pc:sldMk cId="1847188119" sldId="260"/>
+            <ac:spMk id="3" creationId="{FB9B0E28-205D-4B8D-B72F-75D77CF2161D}"/>
+          </ac:spMkLst>
+        </pc:spChg>
+        <pc:picChg chg="mod">
+          <ac:chgData name="Magnus Ahlkvist" userId="ada356d894bd2de7" providerId="LiveId" clId="{AE30E77A-B034-4EFF-9C84-45F53A6DE982}" dt="2020-04-06T19:51:10.554" v="26" actId="26606"/>
+          <ac:picMkLst>
+            <pc:docMk/>
+            <pc:sldMk cId="1847188119" sldId="260"/>
+            <ac:picMk id="5" creationId="{099A75BC-ED83-4232-8CE1-447DBDA9BC2E}"/>
+          </ac:picMkLst>
+        </pc:picChg>
+      </pc:sldChg>
+      <pc:sldChg chg="modSp mod">
+        <pc:chgData name="Magnus Ahlkvist" userId="ada356d894bd2de7" providerId="LiveId" clId="{AE30E77A-B034-4EFF-9C84-45F53A6DE982}" dt="2020-04-06T20:49:07.114" v="1353" actId="6549"/>
+        <pc:sldMkLst>
+          <pc:docMk/>
+          <pc:sldMk cId="7591363" sldId="261"/>
+        </pc:sldMkLst>
+        <pc:spChg chg="mod">
+          <ac:chgData name="Magnus Ahlkvist" userId="ada356d894bd2de7" providerId="LiveId" clId="{AE30E77A-B034-4EFF-9C84-45F53A6DE982}" dt="2020-04-06T20:49:07.114" v="1353" actId="6549"/>
+          <ac:spMkLst>
+            <pc:docMk/>
+            <pc:sldMk cId="7591363" sldId="261"/>
+            <ac:spMk id="2" creationId="{70C438DB-20F7-4B34-8E2C-4BF45E7293A3}"/>
+          </ac:spMkLst>
+        </pc:spChg>
+        <pc:spChg chg="mod">
+          <ac:chgData name="Magnus Ahlkvist" userId="ada356d894bd2de7" providerId="LiveId" clId="{AE30E77A-B034-4EFF-9C84-45F53A6DE982}" dt="2020-04-06T20:09:58.978" v="1024" actId="20577"/>
+          <ac:spMkLst>
+            <pc:docMk/>
+            <pc:sldMk cId="7591363" sldId="261"/>
+            <ac:spMk id="3" creationId="{3308BB25-8932-48AF-AEB6-FF932D5D492F}"/>
+          </ac:spMkLst>
+        </pc:spChg>
+      </pc:sldChg>
+      <pc:sldChg chg="addSp delSp modSp mod">
+        <pc:chgData name="Magnus Ahlkvist" userId="ada356d894bd2de7" providerId="LiveId" clId="{AE30E77A-B034-4EFF-9C84-45F53A6DE982}" dt="2020-04-06T20:00:24.573" v="651" actId="20577"/>
+        <pc:sldMkLst>
+          <pc:docMk/>
+          <pc:sldMk cId="3822221816" sldId="269"/>
+        </pc:sldMkLst>
+        <pc:spChg chg="mod">
+          <ac:chgData name="Magnus Ahlkvist" userId="ada356d894bd2de7" providerId="LiveId" clId="{AE30E77A-B034-4EFF-9C84-45F53A6DE982}" dt="2020-04-06T20:00:24.573" v="651" actId="20577"/>
+          <ac:spMkLst>
+            <pc:docMk/>
+            <pc:sldMk cId="3822221816" sldId="269"/>
+            <ac:spMk id="2" creationId="{3A9EEC31-E066-4E62-BAAB-C170893FFE25}"/>
+          </ac:spMkLst>
+        </pc:spChg>
+        <pc:spChg chg="del mod">
+          <ac:chgData name="Magnus Ahlkvist" userId="ada356d894bd2de7" providerId="LiveId" clId="{AE30E77A-B034-4EFF-9C84-45F53A6DE982}" dt="2020-04-06T19:58:02.448" v="496" actId="931"/>
+          <ac:spMkLst>
+            <pc:docMk/>
+            <pc:sldMk cId="3822221816" sldId="269"/>
+            <ac:spMk id="3" creationId="{E1D671D4-773E-40DF-8D16-784894275E8E}"/>
+          </ac:spMkLst>
+        </pc:spChg>
+        <pc:spChg chg="add del mod">
+          <ac:chgData name="Magnus Ahlkvist" userId="ada356d894bd2de7" providerId="LiveId" clId="{AE30E77A-B034-4EFF-9C84-45F53A6DE982}" dt="2020-04-06T19:58:16.784" v="499" actId="478"/>
+          <ac:spMkLst>
+            <pc:docMk/>
+            <pc:sldMk cId="3822221816" sldId="269"/>
+            <ac:spMk id="6" creationId="{2C1E75A9-5441-4095-B752-71AEA71511D4}"/>
+          </ac:spMkLst>
+        </pc:spChg>
+        <pc:spChg chg="add del mod">
+          <ac:chgData name="Magnus Ahlkvist" userId="ada356d894bd2de7" providerId="LiveId" clId="{AE30E77A-B034-4EFF-9C84-45F53A6DE982}" dt="2020-04-06T19:58:42.086" v="500" actId="931"/>
+          <ac:spMkLst>
+            <pc:docMk/>
+            <pc:sldMk cId="3822221816" sldId="269"/>
+            <ac:spMk id="8" creationId="{CA95009C-8ADF-4350-8F14-A777AA43F6D4}"/>
+          </ac:spMkLst>
+        </pc:spChg>
+        <pc:spChg chg="add mod">
+          <ac:chgData name="Magnus Ahlkvist" userId="ada356d894bd2de7" providerId="LiveId" clId="{AE30E77A-B034-4EFF-9C84-45F53A6DE982}" dt="2020-04-06T19:59:36.209" v="591" actId="6549"/>
+          <ac:spMkLst>
+            <pc:docMk/>
+            <pc:sldMk cId="3822221816" sldId="269"/>
+            <ac:spMk id="11" creationId="{0994B5B1-0439-418A-88E2-85F119ECFB6C}"/>
+          </ac:spMkLst>
+        </pc:spChg>
+        <pc:picChg chg="add del mod">
+          <ac:chgData name="Magnus Ahlkvist" userId="ada356d894bd2de7" providerId="LiveId" clId="{AE30E77A-B034-4EFF-9C84-45F53A6DE982}" dt="2020-04-06T19:58:16.784" v="499" actId="478"/>
+          <ac:picMkLst>
+            <pc:docMk/>
+            <pc:sldMk cId="3822221816" sldId="269"/>
+            <ac:picMk id="5" creationId="{BF5F635A-5302-424F-B288-F7B571DE9BE6}"/>
+          </ac:picMkLst>
+        </pc:picChg>
+        <pc:picChg chg="add mod">
+          <ac:chgData name="Magnus Ahlkvist" userId="ada356d894bd2de7" providerId="LiveId" clId="{AE30E77A-B034-4EFF-9C84-45F53A6DE982}" dt="2020-04-06T19:58:44.074" v="502" actId="962"/>
+          <ac:picMkLst>
+            <pc:docMk/>
+            <pc:sldMk cId="3822221816" sldId="269"/>
+            <ac:picMk id="10" creationId="{A28CDC4B-3539-4879-91A5-8438A510BCC7}"/>
+          </ac:picMkLst>
+        </pc:picChg>
+      </pc:sldChg>
+      <pc:sldChg chg="addSp delSp modSp mod">
+        <pc:chgData name="Magnus Ahlkvist" userId="ada356d894bd2de7" providerId="LiveId" clId="{AE30E77A-B034-4EFF-9C84-45F53A6DE982}" dt="2020-04-06T20:06:58.640" v="870" actId="6549"/>
+        <pc:sldMkLst>
+          <pc:docMk/>
+          <pc:sldMk cId="2109321193" sldId="270"/>
+        </pc:sldMkLst>
+        <pc:spChg chg="mod">
+          <ac:chgData name="Magnus Ahlkvist" userId="ada356d894bd2de7" providerId="LiveId" clId="{AE30E77A-B034-4EFF-9C84-45F53A6DE982}" dt="2020-04-06T20:00:20.140" v="649" actId="20577"/>
+          <ac:spMkLst>
+            <pc:docMk/>
+            <pc:sldMk cId="2109321193" sldId="270"/>
+            <ac:spMk id="2" creationId="{3A9EEC31-E066-4E62-BAAB-C170893FFE25}"/>
+          </ac:spMkLst>
+        </pc:spChg>
+        <pc:spChg chg="del mod">
+          <ac:chgData name="Magnus Ahlkvist" userId="ada356d894bd2de7" providerId="LiveId" clId="{AE30E77A-B034-4EFF-9C84-45F53A6DE982}" dt="2020-04-06T20:02:39.360" v="653" actId="931"/>
+          <ac:spMkLst>
+            <pc:docMk/>
+            <pc:sldMk cId="2109321193" sldId="270"/>
+            <ac:spMk id="3" creationId="{B0EC0419-6AE2-43CD-85D1-EED960D9A9DB}"/>
+          </ac:spMkLst>
+        </pc:spChg>
+        <pc:spChg chg="add mod">
+          <ac:chgData name="Magnus Ahlkvist" userId="ada356d894bd2de7" providerId="LiveId" clId="{AE30E77A-B034-4EFF-9C84-45F53A6DE982}" dt="2020-04-06T20:06:26.169" v="804" actId="1076"/>
+          <ac:spMkLst>
+            <pc:docMk/>
+            <pc:sldMk cId="2109321193" sldId="270"/>
+            <ac:spMk id="6" creationId="{2367372C-C324-4564-A18A-117C4263FDEB}"/>
+          </ac:spMkLst>
+        </pc:spChg>
+        <pc:spChg chg="add mod">
+          <ac:chgData name="Magnus Ahlkvist" userId="ada356d894bd2de7" providerId="LiveId" clId="{AE30E77A-B034-4EFF-9C84-45F53A6DE982}" dt="2020-04-06T20:06:00.155" v="802" actId="14100"/>
+          <ac:spMkLst>
+            <pc:docMk/>
+            <pc:sldMk cId="2109321193" sldId="270"/>
+            <ac:spMk id="9" creationId="{4DF4DFDA-17FC-4372-A52B-1CEAC295D762}"/>
+          </ac:spMkLst>
+        </pc:spChg>
+        <pc:spChg chg="add mod">
+          <ac:chgData name="Magnus Ahlkvist" userId="ada356d894bd2de7" providerId="LiveId" clId="{AE30E77A-B034-4EFF-9C84-45F53A6DE982}" dt="2020-04-06T20:06:58.640" v="870" actId="6549"/>
+          <ac:spMkLst>
+            <pc:docMk/>
+            <pc:sldMk cId="2109321193" sldId="270"/>
+            <ac:spMk id="12" creationId="{437AF3A7-69D5-4171-BF17-096B68F43217}"/>
+          </ac:spMkLst>
+        </pc:spChg>
+        <pc:picChg chg="add mod">
+          <ac:chgData name="Magnus Ahlkvist" userId="ada356d894bd2de7" providerId="LiveId" clId="{AE30E77A-B034-4EFF-9C84-45F53A6DE982}" dt="2020-04-06T20:06:26.169" v="804" actId="1076"/>
+          <ac:picMkLst>
+            <pc:docMk/>
+            <pc:sldMk cId="2109321193" sldId="270"/>
+            <ac:picMk id="5" creationId="{A6511893-1401-4B11-86C1-87D176AF21B5}"/>
+          </ac:picMkLst>
+        </pc:picChg>
+        <pc:picChg chg="add mod">
+          <ac:chgData name="Magnus Ahlkvist" userId="ada356d894bd2de7" providerId="LiveId" clId="{AE30E77A-B034-4EFF-9C84-45F53A6DE982}" dt="2020-04-06T20:05:50.989" v="800" actId="14100"/>
+          <ac:picMkLst>
+            <pc:docMk/>
+            <pc:sldMk cId="2109321193" sldId="270"/>
+            <ac:picMk id="8" creationId="{2A7C222B-B45F-456C-9773-49C2198CE4A5}"/>
+          </ac:picMkLst>
+        </pc:picChg>
+        <pc:picChg chg="add mod">
+          <ac:chgData name="Magnus Ahlkvist" userId="ada356d894bd2de7" providerId="LiveId" clId="{AE30E77A-B034-4EFF-9C84-45F53A6DE982}" dt="2020-04-06T20:06:18.240" v="803" actId="1076"/>
+          <ac:picMkLst>
+            <pc:docMk/>
+            <pc:sldMk cId="2109321193" sldId="270"/>
+            <ac:picMk id="11" creationId="{478A31E7-B3FC-4EF5-A2D2-0A5AA0DE761E}"/>
+          </ac:picMkLst>
+        </pc:picChg>
+      </pc:sldChg>
+      <pc:sldChg chg="modSp mod">
+        <pc:chgData name="Magnus Ahlkvist" userId="ada356d894bd2de7" providerId="LiveId" clId="{AE30E77A-B034-4EFF-9C84-45F53A6DE982}" dt="2020-04-06T19:56:43.030" v="473" actId="20577"/>
+        <pc:sldMkLst>
+          <pc:docMk/>
+          <pc:sldMk cId="724312294" sldId="274"/>
+        </pc:sldMkLst>
+        <pc:spChg chg="mod">
+          <ac:chgData name="Magnus Ahlkvist" userId="ada356d894bd2de7" providerId="LiveId" clId="{AE30E77A-B034-4EFF-9C84-45F53A6DE982}" dt="2020-04-06T19:56:43.030" v="473" actId="20577"/>
+          <ac:spMkLst>
+            <pc:docMk/>
+            <pc:sldMk cId="724312294" sldId="274"/>
+            <ac:spMk id="3" creationId="{F6C68B1F-FCAB-447B-9599-F74CDF1EDDA5}"/>
+          </ac:spMkLst>
+        </pc:spChg>
+      </pc:sldChg>
+      <pc:sldChg chg="modSp mod">
+        <pc:chgData name="Magnus Ahlkvist" userId="ada356d894bd2de7" providerId="LiveId" clId="{AE30E77A-B034-4EFF-9C84-45F53A6DE982}" dt="2020-04-06T20:45:09.586" v="1195" actId="6549"/>
+        <pc:sldMkLst>
+          <pc:docMk/>
+          <pc:sldMk cId="3531482130" sldId="280"/>
+        </pc:sldMkLst>
+        <pc:spChg chg="mod">
+          <ac:chgData name="Magnus Ahlkvist" userId="ada356d894bd2de7" providerId="LiveId" clId="{AE30E77A-B034-4EFF-9C84-45F53A6DE982}" dt="2020-04-06T20:45:09.586" v="1195" actId="6549"/>
+          <ac:spMkLst>
+            <pc:docMk/>
+            <pc:sldMk cId="3531482130" sldId="280"/>
+            <ac:spMk id="4" creationId="{B815B6F0-441C-4C91-AB08-6E805A1963BC}"/>
+          </ac:spMkLst>
+        </pc:spChg>
+      </pc:sldChg>
+      <pc:sldChg chg="del">
+        <pc:chgData name="Magnus Ahlkvist" userId="ada356d894bd2de7" providerId="LiveId" clId="{AE30E77A-B034-4EFF-9C84-45F53A6DE982}" dt="2020-04-06T19:51:51.332" v="74" actId="47"/>
+        <pc:sldMkLst>
+          <pc:docMk/>
+          <pc:sldMk cId="41989243" sldId="283"/>
+        </pc:sldMkLst>
+      </pc:sldChg>
+      <pc:sldChg chg="addSp delSp modSp add mod">
+        <pc:chgData name="Magnus Ahlkvist" userId="ada356d894bd2de7" providerId="LiveId" clId="{AE30E77A-B034-4EFF-9C84-45F53A6DE982}" dt="2020-04-06T20:44:19.082" v="1185" actId="14100"/>
+        <pc:sldMkLst>
+          <pc:docMk/>
+          <pc:sldMk cId="3066192018" sldId="285"/>
+        </pc:sldMkLst>
+        <pc:spChg chg="mod">
+          <ac:chgData name="Magnus Ahlkvist" userId="ada356d894bd2de7" providerId="LiveId" clId="{AE30E77A-B034-4EFF-9C84-45F53A6DE982}" dt="2020-04-06T20:07:41.740" v="916" actId="20577"/>
+          <ac:spMkLst>
+            <pc:docMk/>
+            <pc:sldMk cId="3066192018" sldId="285"/>
+            <ac:spMk id="2" creationId="{C3C68CBF-126E-4672-92BD-E421E735BEEB}"/>
+          </ac:spMkLst>
+        </pc:spChg>
+        <pc:spChg chg="del mod">
+          <ac:chgData name="Magnus Ahlkvist" userId="ada356d894bd2de7" providerId="LiveId" clId="{AE30E77A-B034-4EFF-9C84-45F53A6DE982}" dt="2020-04-06T20:41:40.603" v="1136"/>
+          <ac:spMkLst>
+            <pc:docMk/>
+            <pc:sldMk cId="3066192018" sldId="285"/>
+            <ac:spMk id="3" creationId="{C5E5A6B3-974E-4F18-A805-115C69154665}"/>
+          </ac:spMkLst>
+        </pc:spChg>
+        <pc:spChg chg="add mod">
+          <ac:chgData name="Magnus Ahlkvist" userId="ada356d894bd2de7" providerId="LiveId" clId="{AE30E77A-B034-4EFF-9C84-45F53A6DE982}" dt="2020-04-06T20:44:19.082" v="1185" actId="14100"/>
+          <ac:spMkLst>
+            <pc:docMk/>
+            <pc:sldMk cId="3066192018" sldId="285"/>
+            <ac:spMk id="6" creationId="{20083EBD-9CAC-44D3-B6CC-EB14696096B7}"/>
+          </ac:spMkLst>
+        </pc:spChg>
+        <pc:picChg chg="add mod">
+          <ac:chgData name="Magnus Ahlkvist" userId="ada356d894bd2de7" providerId="LiveId" clId="{AE30E77A-B034-4EFF-9C84-45F53A6DE982}" dt="2020-04-06T20:41:48.466" v="1139" actId="1076"/>
+          <ac:picMkLst>
+            <pc:docMk/>
+            <pc:sldMk cId="3066192018" sldId="285"/>
+            <ac:picMk id="5" creationId="{FFBB1DD4-A052-46B7-AB00-EA35FCCF3A26}"/>
+          </ac:picMkLst>
+        </pc:picChg>
+      </pc:sldChg>
+      <pc:sldChg chg="addSp delSp modSp add mod">
+        <pc:chgData name="Magnus Ahlkvist" userId="ada356d894bd2de7" providerId="LiveId" clId="{AE30E77A-B034-4EFF-9C84-45F53A6DE982}" dt="2020-04-06T20:11:50.811" v="1135" actId="20577"/>
+        <pc:sldMkLst>
+          <pc:docMk/>
+          <pc:sldMk cId="3654011242" sldId="286"/>
+        </pc:sldMkLst>
+        <pc:spChg chg="mod">
+          <ac:chgData name="Magnus Ahlkvist" userId="ada356d894bd2de7" providerId="LiveId" clId="{AE30E77A-B034-4EFF-9C84-45F53A6DE982}" dt="2020-04-06T20:10:28.677" v="1046" actId="20577"/>
+          <ac:spMkLst>
+            <pc:docMk/>
+            <pc:sldMk cId="3654011242" sldId="286"/>
+            <ac:spMk id="2" creationId="{DF035DBA-691F-4721-896A-CAEA20A027DA}"/>
+          </ac:spMkLst>
+        </pc:spChg>
+        <pc:spChg chg="add del">
+          <ac:chgData name="Magnus Ahlkvist" userId="ada356d894bd2de7" providerId="LiveId" clId="{AE30E77A-B034-4EFF-9C84-45F53A6DE982}" dt="2020-04-06T20:11:21.476" v="1065" actId="931"/>
+          <ac:spMkLst>
+            <pc:docMk/>
+            <pc:sldMk cId="3654011242" sldId="286"/>
+            <ac:spMk id="3" creationId="{84FD6EC7-775E-4167-A2C0-3AB509AC7DC0}"/>
+          </ac:spMkLst>
+        </pc:spChg>
+        <pc:spChg chg="add del mod">
+          <ac:chgData name="Magnus Ahlkvist" userId="ada356d894bd2de7" providerId="LiveId" clId="{AE30E77A-B034-4EFF-9C84-45F53A6DE982}" dt="2020-04-06T20:11:50.811" v="1135" actId="20577"/>
+          <ac:spMkLst>
+            <pc:docMk/>
+            <pc:sldMk cId="3654011242" sldId="286"/>
+            <ac:spMk id="6" creationId="{1BAD3EB1-4924-47AE-984B-646272857433}"/>
+          </ac:spMkLst>
+        </pc:spChg>
+        <pc:picChg chg="add del mod">
+          <ac:chgData name="Magnus Ahlkvist" userId="ada356d894bd2de7" providerId="LiveId" clId="{AE30E77A-B034-4EFF-9C84-45F53A6DE982}" dt="2020-04-06T20:11:21.476" v="1065" actId="931"/>
+          <ac:picMkLst>
+            <pc:docMk/>
+            <pc:sldMk cId="3654011242" sldId="286"/>
+            <ac:picMk id="5" creationId="{E54B2FB3-EFD3-4B9B-A075-A2DDBF92EF99}"/>
+          </ac:picMkLst>
+        </pc:picChg>
+      </pc:sldChg>
+    </pc:docChg>
+  </pc:docChgLst>
   <pc:docChgLst>
     <pc:chgData name="Magnus Ahlkvist" userId="ada356d894bd2de7" providerId="LiveId" clId="{299A5E06-426A-4787-AE18-3167D3E1E138}"/>
     <pc:docChg chg="undo custSel addSld delSld modSld modMainMaster">
@@ -746,451 +1185,6 @@
     </pc:docChg>
   </pc:docChgLst>
   <pc:docChgLst>
-    <pc:chgData name="Magnus Ahlkvist" userId="ada356d894bd2de7" providerId="LiveId" clId="{07E3E307-9A68-4597-B735-5F5EBF997CF0}"/>
-    <pc:docChg chg="modSld">
-      <pc:chgData name="Magnus Ahlkvist" userId="ada356d894bd2de7" providerId="LiveId" clId="{07E3E307-9A68-4597-B735-5F5EBF997CF0}" dt="2019-11-13T05:58:18.829" v="9" actId="1076"/>
-      <pc:docMkLst>
-        <pc:docMk/>
-      </pc:docMkLst>
-      <pc:sldChg chg="addSp modSp">
-        <pc:chgData name="Magnus Ahlkvist" userId="ada356d894bd2de7" providerId="LiveId" clId="{07E3E307-9A68-4597-B735-5F5EBF997CF0}" dt="2019-11-13T05:58:18.829" v="9" actId="1076"/>
-        <pc:sldMkLst>
-          <pc:docMk/>
-          <pc:sldMk cId="1847188119" sldId="260"/>
-        </pc:sldMkLst>
-        <pc:picChg chg="add mod modCrop">
-          <ac:chgData name="Magnus Ahlkvist" userId="ada356d894bd2de7" providerId="LiveId" clId="{07E3E307-9A68-4597-B735-5F5EBF997CF0}" dt="2019-11-13T05:58:18.829" v="9" actId="1076"/>
-          <ac:picMkLst>
-            <pc:docMk/>
-            <pc:sldMk cId="1847188119" sldId="260"/>
-            <ac:picMk id="5" creationId="{099A75BC-ED83-4232-8CE1-447DBDA9BC2E}"/>
-          </ac:picMkLst>
-        </pc:picChg>
-      </pc:sldChg>
-    </pc:docChg>
-  </pc:docChgLst>
-  <pc:docChgLst>
-    <pc:chgData name="Magnus Ahlkvist" userId="ada356d894bd2de7" providerId="LiveId" clId="{AE30E77A-B034-4EFF-9C84-45F53A6DE982}"/>
-    <pc:docChg chg="undo redo custSel mod addSld delSld modSld">
-      <pc:chgData name="Magnus Ahlkvist" userId="ada356d894bd2de7" providerId="LiveId" clId="{AE30E77A-B034-4EFF-9C84-45F53A6DE982}" dt="2020-04-06T20:49:07.114" v="1353" actId="6549"/>
-      <pc:docMkLst>
-        <pc:docMk/>
-      </pc:docMkLst>
-      <pc:sldChg chg="addSp modSp mod">
-        <pc:chgData name="Magnus Ahlkvist" userId="ada356d894bd2de7" providerId="LiveId" clId="{AE30E77A-B034-4EFF-9C84-45F53A6DE982}" dt="2020-04-06T20:48:35.224" v="1352" actId="20577"/>
-        <pc:sldMkLst>
-          <pc:docMk/>
-          <pc:sldMk cId="6683241" sldId="257"/>
-        </pc:sldMkLst>
-        <pc:spChg chg="mod">
-          <ac:chgData name="Magnus Ahlkvist" userId="ada356d894bd2de7" providerId="LiveId" clId="{AE30E77A-B034-4EFF-9C84-45F53A6DE982}" dt="2020-04-06T20:48:35.224" v="1352" actId="20577"/>
-          <ac:spMkLst>
-            <pc:docMk/>
-            <pc:sldMk cId="6683241" sldId="257"/>
-            <ac:spMk id="3" creationId="{00000000-0000-0000-0000-000000000000}"/>
-          </ac:spMkLst>
-        </pc:spChg>
-        <pc:spChg chg="add mod">
-          <ac:chgData name="Magnus Ahlkvist" userId="ada356d894bd2de7" providerId="LiveId" clId="{AE30E77A-B034-4EFF-9C84-45F53A6DE982}" dt="2020-04-06T20:48:17.761" v="1323" actId="1076"/>
-          <ac:spMkLst>
-            <pc:docMk/>
-            <pc:sldMk cId="6683241" sldId="257"/>
-            <ac:spMk id="6" creationId="{E7DCA6E0-1CB4-4729-9F7F-F2968708EDBE}"/>
-          </ac:spMkLst>
-        </pc:spChg>
-        <pc:picChg chg="add mod">
-          <ac:chgData name="Magnus Ahlkvist" userId="ada356d894bd2de7" providerId="LiveId" clId="{AE30E77A-B034-4EFF-9C84-45F53A6DE982}" dt="2020-04-06T20:48:17.761" v="1323" actId="1076"/>
-          <ac:picMkLst>
-            <pc:docMk/>
-            <pc:sldMk cId="6683241" sldId="257"/>
-            <ac:picMk id="5" creationId="{1268A56F-28EF-4F25-A019-10D5AD3D0098}"/>
-          </ac:picMkLst>
-        </pc:picChg>
-      </pc:sldChg>
-      <pc:sldChg chg="modSp mod modClrScheme chgLayout">
-        <pc:chgData name="Magnus Ahlkvist" userId="ada356d894bd2de7" providerId="LiveId" clId="{AE30E77A-B034-4EFF-9C84-45F53A6DE982}" dt="2020-04-06T20:47:10.118" v="1284" actId="20577"/>
-        <pc:sldMkLst>
-          <pc:docMk/>
-          <pc:sldMk cId="1847188119" sldId="260"/>
-        </pc:sldMkLst>
-        <pc:spChg chg="mod">
-          <ac:chgData name="Magnus Ahlkvist" userId="ada356d894bd2de7" providerId="LiveId" clId="{AE30E77A-B034-4EFF-9C84-45F53A6DE982}" dt="2020-04-06T19:51:44.494" v="73" actId="14100"/>
-          <ac:spMkLst>
-            <pc:docMk/>
-            <pc:sldMk cId="1847188119" sldId="260"/>
-            <ac:spMk id="2" creationId="{3A9EEC31-E066-4E62-BAAB-C170893FFE25}"/>
-          </ac:spMkLst>
-        </pc:spChg>
-        <pc:spChg chg="mod ord">
-          <ac:chgData name="Magnus Ahlkvist" userId="ada356d894bd2de7" providerId="LiveId" clId="{AE30E77A-B034-4EFF-9C84-45F53A6DE982}" dt="2020-04-06T20:47:10.118" v="1284" actId="20577"/>
-          <ac:spMkLst>
-            <pc:docMk/>
-            <pc:sldMk cId="1847188119" sldId="260"/>
-            <ac:spMk id="3" creationId="{FB9B0E28-205D-4B8D-B72F-75D77CF2161D}"/>
-          </ac:spMkLst>
-        </pc:spChg>
-        <pc:picChg chg="mod">
-          <ac:chgData name="Magnus Ahlkvist" userId="ada356d894bd2de7" providerId="LiveId" clId="{AE30E77A-B034-4EFF-9C84-45F53A6DE982}" dt="2020-04-06T19:51:10.554" v="26" actId="26606"/>
-          <ac:picMkLst>
-            <pc:docMk/>
-            <pc:sldMk cId="1847188119" sldId="260"/>
-            <ac:picMk id="5" creationId="{099A75BC-ED83-4232-8CE1-447DBDA9BC2E}"/>
-          </ac:picMkLst>
-        </pc:picChg>
-      </pc:sldChg>
-      <pc:sldChg chg="modSp mod">
-        <pc:chgData name="Magnus Ahlkvist" userId="ada356d894bd2de7" providerId="LiveId" clId="{AE30E77A-B034-4EFF-9C84-45F53A6DE982}" dt="2020-04-06T20:49:07.114" v="1353" actId="6549"/>
-        <pc:sldMkLst>
-          <pc:docMk/>
-          <pc:sldMk cId="7591363" sldId="261"/>
-        </pc:sldMkLst>
-        <pc:spChg chg="mod">
-          <ac:chgData name="Magnus Ahlkvist" userId="ada356d894bd2de7" providerId="LiveId" clId="{AE30E77A-B034-4EFF-9C84-45F53A6DE982}" dt="2020-04-06T20:49:07.114" v="1353" actId="6549"/>
-          <ac:spMkLst>
-            <pc:docMk/>
-            <pc:sldMk cId="7591363" sldId="261"/>
-            <ac:spMk id="2" creationId="{70C438DB-20F7-4B34-8E2C-4BF45E7293A3}"/>
-          </ac:spMkLst>
-        </pc:spChg>
-        <pc:spChg chg="mod">
-          <ac:chgData name="Magnus Ahlkvist" userId="ada356d894bd2de7" providerId="LiveId" clId="{AE30E77A-B034-4EFF-9C84-45F53A6DE982}" dt="2020-04-06T20:09:58.978" v="1024" actId="20577"/>
-          <ac:spMkLst>
-            <pc:docMk/>
-            <pc:sldMk cId="7591363" sldId="261"/>
-            <ac:spMk id="3" creationId="{3308BB25-8932-48AF-AEB6-FF932D5D492F}"/>
-          </ac:spMkLst>
-        </pc:spChg>
-      </pc:sldChg>
-      <pc:sldChg chg="addSp delSp modSp mod">
-        <pc:chgData name="Magnus Ahlkvist" userId="ada356d894bd2de7" providerId="LiveId" clId="{AE30E77A-B034-4EFF-9C84-45F53A6DE982}" dt="2020-04-06T20:00:24.573" v="651" actId="20577"/>
-        <pc:sldMkLst>
-          <pc:docMk/>
-          <pc:sldMk cId="3822221816" sldId="269"/>
-        </pc:sldMkLst>
-        <pc:spChg chg="mod">
-          <ac:chgData name="Magnus Ahlkvist" userId="ada356d894bd2de7" providerId="LiveId" clId="{AE30E77A-B034-4EFF-9C84-45F53A6DE982}" dt="2020-04-06T20:00:24.573" v="651" actId="20577"/>
-          <ac:spMkLst>
-            <pc:docMk/>
-            <pc:sldMk cId="3822221816" sldId="269"/>
-            <ac:spMk id="2" creationId="{3A9EEC31-E066-4E62-BAAB-C170893FFE25}"/>
-          </ac:spMkLst>
-        </pc:spChg>
-        <pc:spChg chg="del mod">
-          <ac:chgData name="Magnus Ahlkvist" userId="ada356d894bd2de7" providerId="LiveId" clId="{AE30E77A-B034-4EFF-9C84-45F53A6DE982}" dt="2020-04-06T19:58:02.448" v="496" actId="931"/>
-          <ac:spMkLst>
-            <pc:docMk/>
-            <pc:sldMk cId="3822221816" sldId="269"/>
-            <ac:spMk id="3" creationId="{E1D671D4-773E-40DF-8D16-784894275E8E}"/>
-          </ac:spMkLst>
-        </pc:spChg>
-        <pc:spChg chg="add del mod">
-          <ac:chgData name="Magnus Ahlkvist" userId="ada356d894bd2de7" providerId="LiveId" clId="{AE30E77A-B034-4EFF-9C84-45F53A6DE982}" dt="2020-04-06T19:58:16.784" v="499" actId="478"/>
-          <ac:spMkLst>
-            <pc:docMk/>
-            <pc:sldMk cId="3822221816" sldId="269"/>
-            <ac:spMk id="6" creationId="{2C1E75A9-5441-4095-B752-71AEA71511D4}"/>
-          </ac:spMkLst>
-        </pc:spChg>
-        <pc:spChg chg="add del mod">
-          <ac:chgData name="Magnus Ahlkvist" userId="ada356d894bd2de7" providerId="LiveId" clId="{AE30E77A-B034-4EFF-9C84-45F53A6DE982}" dt="2020-04-06T19:58:42.086" v="500" actId="931"/>
-          <ac:spMkLst>
-            <pc:docMk/>
-            <pc:sldMk cId="3822221816" sldId="269"/>
-            <ac:spMk id="8" creationId="{CA95009C-8ADF-4350-8F14-A777AA43F6D4}"/>
-          </ac:spMkLst>
-        </pc:spChg>
-        <pc:spChg chg="add mod">
-          <ac:chgData name="Magnus Ahlkvist" userId="ada356d894bd2de7" providerId="LiveId" clId="{AE30E77A-B034-4EFF-9C84-45F53A6DE982}" dt="2020-04-06T19:59:36.209" v="591" actId="6549"/>
-          <ac:spMkLst>
-            <pc:docMk/>
-            <pc:sldMk cId="3822221816" sldId="269"/>
-            <ac:spMk id="11" creationId="{0994B5B1-0439-418A-88E2-85F119ECFB6C}"/>
-          </ac:spMkLst>
-        </pc:spChg>
-        <pc:picChg chg="add del mod">
-          <ac:chgData name="Magnus Ahlkvist" userId="ada356d894bd2de7" providerId="LiveId" clId="{AE30E77A-B034-4EFF-9C84-45F53A6DE982}" dt="2020-04-06T19:58:16.784" v="499" actId="478"/>
-          <ac:picMkLst>
-            <pc:docMk/>
-            <pc:sldMk cId="3822221816" sldId="269"/>
-            <ac:picMk id="5" creationId="{BF5F635A-5302-424F-B288-F7B571DE9BE6}"/>
-          </ac:picMkLst>
-        </pc:picChg>
-        <pc:picChg chg="add mod">
-          <ac:chgData name="Magnus Ahlkvist" userId="ada356d894bd2de7" providerId="LiveId" clId="{AE30E77A-B034-4EFF-9C84-45F53A6DE982}" dt="2020-04-06T19:58:44.074" v="502" actId="962"/>
-          <ac:picMkLst>
-            <pc:docMk/>
-            <pc:sldMk cId="3822221816" sldId="269"/>
-            <ac:picMk id="10" creationId="{A28CDC4B-3539-4879-91A5-8438A510BCC7}"/>
-          </ac:picMkLst>
-        </pc:picChg>
-      </pc:sldChg>
-      <pc:sldChg chg="addSp delSp modSp mod">
-        <pc:chgData name="Magnus Ahlkvist" userId="ada356d894bd2de7" providerId="LiveId" clId="{AE30E77A-B034-4EFF-9C84-45F53A6DE982}" dt="2020-04-06T20:06:58.640" v="870" actId="6549"/>
-        <pc:sldMkLst>
-          <pc:docMk/>
-          <pc:sldMk cId="2109321193" sldId="270"/>
-        </pc:sldMkLst>
-        <pc:spChg chg="mod">
-          <ac:chgData name="Magnus Ahlkvist" userId="ada356d894bd2de7" providerId="LiveId" clId="{AE30E77A-B034-4EFF-9C84-45F53A6DE982}" dt="2020-04-06T20:00:20.140" v="649" actId="20577"/>
-          <ac:spMkLst>
-            <pc:docMk/>
-            <pc:sldMk cId="2109321193" sldId="270"/>
-            <ac:spMk id="2" creationId="{3A9EEC31-E066-4E62-BAAB-C170893FFE25}"/>
-          </ac:spMkLst>
-        </pc:spChg>
-        <pc:spChg chg="del mod">
-          <ac:chgData name="Magnus Ahlkvist" userId="ada356d894bd2de7" providerId="LiveId" clId="{AE30E77A-B034-4EFF-9C84-45F53A6DE982}" dt="2020-04-06T20:02:39.360" v="653" actId="931"/>
-          <ac:spMkLst>
-            <pc:docMk/>
-            <pc:sldMk cId="2109321193" sldId="270"/>
-            <ac:spMk id="3" creationId="{B0EC0419-6AE2-43CD-85D1-EED960D9A9DB}"/>
-          </ac:spMkLst>
-        </pc:spChg>
-        <pc:spChg chg="add mod">
-          <ac:chgData name="Magnus Ahlkvist" userId="ada356d894bd2de7" providerId="LiveId" clId="{AE30E77A-B034-4EFF-9C84-45F53A6DE982}" dt="2020-04-06T20:06:26.169" v="804" actId="1076"/>
-          <ac:spMkLst>
-            <pc:docMk/>
-            <pc:sldMk cId="2109321193" sldId="270"/>
-            <ac:spMk id="6" creationId="{2367372C-C324-4564-A18A-117C4263FDEB}"/>
-          </ac:spMkLst>
-        </pc:spChg>
-        <pc:spChg chg="add mod">
-          <ac:chgData name="Magnus Ahlkvist" userId="ada356d894bd2de7" providerId="LiveId" clId="{AE30E77A-B034-4EFF-9C84-45F53A6DE982}" dt="2020-04-06T20:06:00.155" v="802" actId="14100"/>
-          <ac:spMkLst>
-            <pc:docMk/>
-            <pc:sldMk cId="2109321193" sldId="270"/>
-            <ac:spMk id="9" creationId="{4DF4DFDA-17FC-4372-A52B-1CEAC295D762}"/>
-          </ac:spMkLst>
-        </pc:spChg>
-        <pc:spChg chg="add mod">
-          <ac:chgData name="Magnus Ahlkvist" userId="ada356d894bd2de7" providerId="LiveId" clId="{AE30E77A-B034-4EFF-9C84-45F53A6DE982}" dt="2020-04-06T20:06:58.640" v="870" actId="6549"/>
-          <ac:spMkLst>
-            <pc:docMk/>
-            <pc:sldMk cId="2109321193" sldId="270"/>
-            <ac:spMk id="12" creationId="{437AF3A7-69D5-4171-BF17-096B68F43217}"/>
-          </ac:spMkLst>
-        </pc:spChg>
-        <pc:picChg chg="add mod">
-          <ac:chgData name="Magnus Ahlkvist" userId="ada356d894bd2de7" providerId="LiveId" clId="{AE30E77A-B034-4EFF-9C84-45F53A6DE982}" dt="2020-04-06T20:06:26.169" v="804" actId="1076"/>
-          <ac:picMkLst>
-            <pc:docMk/>
-            <pc:sldMk cId="2109321193" sldId="270"/>
-            <ac:picMk id="5" creationId="{A6511893-1401-4B11-86C1-87D176AF21B5}"/>
-          </ac:picMkLst>
-        </pc:picChg>
-        <pc:picChg chg="add mod">
-          <ac:chgData name="Magnus Ahlkvist" userId="ada356d894bd2de7" providerId="LiveId" clId="{AE30E77A-B034-4EFF-9C84-45F53A6DE982}" dt="2020-04-06T20:05:50.989" v="800" actId="14100"/>
-          <ac:picMkLst>
-            <pc:docMk/>
-            <pc:sldMk cId="2109321193" sldId="270"/>
-            <ac:picMk id="8" creationId="{2A7C222B-B45F-456C-9773-49C2198CE4A5}"/>
-          </ac:picMkLst>
-        </pc:picChg>
-        <pc:picChg chg="add mod">
-          <ac:chgData name="Magnus Ahlkvist" userId="ada356d894bd2de7" providerId="LiveId" clId="{AE30E77A-B034-4EFF-9C84-45F53A6DE982}" dt="2020-04-06T20:06:18.240" v="803" actId="1076"/>
-          <ac:picMkLst>
-            <pc:docMk/>
-            <pc:sldMk cId="2109321193" sldId="270"/>
-            <ac:picMk id="11" creationId="{478A31E7-B3FC-4EF5-A2D2-0A5AA0DE761E}"/>
-          </ac:picMkLst>
-        </pc:picChg>
-      </pc:sldChg>
-      <pc:sldChg chg="modSp mod">
-        <pc:chgData name="Magnus Ahlkvist" userId="ada356d894bd2de7" providerId="LiveId" clId="{AE30E77A-B034-4EFF-9C84-45F53A6DE982}" dt="2020-04-06T19:56:43.030" v="473" actId="20577"/>
-        <pc:sldMkLst>
-          <pc:docMk/>
-          <pc:sldMk cId="724312294" sldId="274"/>
-        </pc:sldMkLst>
-        <pc:spChg chg="mod">
-          <ac:chgData name="Magnus Ahlkvist" userId="ada356d894bd2de7" providerId="LiveId" clId="{AE30E77A-B034-4EFF-9C84-45F53A6DE982}" dt="2020-04-06T19:56:43.030" v="473" actId="20577"/>
-          <ac:spMkLst>
-            <pc:docMk/>
-            <pc:sldMk cId="724312294" sldId="274"/>
-            <ac:spMk id="3" creationId="{F6C68B1F-FCAB-447B-9599-F74CDF1EDDA5}"/>
-          </ac:spMkLst>
-        </pc:spChg>
-      </pc:sldChg>
-      <pc:sldChg chg="modSp mod">
-        <pc:chgData name="Magnus Ahlkvist" userId="ada356d894bd2de7" providerId="LiveId" clId="{AE30E77A-B034-4EFF-9C84-45F53A6DE982}" dt="2020-04-06T20:45:09.586" v="1195" actId="6549"/>
-        <pc:sldMkLst>
-          <pc:docMk/>
-          <pc:sldMk cId="3531482130" sldId="280"/>
-        </pc:sldMkLst>
-        <pc:spChg chg="mod">
-          <ac:chgData name="Magnus Ahlkvist" userId="ada356d894bd2de7" providerId="LiveId" clId="{AE30E77A-B034-4EFF-9C84-45F53A6DE982}" dt="2020-04-06T20:45:09.586" v="1195" actId="6549"/>
-          <ac:spMkLst>
-            <pc:docMk/>
-            <pc:sldMk cId="3531482130" sldId="280"/>
-            <ac:spMk id="4" creationId="{B815B6F0-441C-4C91-AB08-6E805A1963BC}"/>
-          </ac:spMkLst>
-        </pc:spChg>
-      </pc:sldChg>
-      <pc:sldChg chg="del">
-        <pc:chgData name="Magnus Ahlkvist" userId="ada356d894bd2de7" providerId="LiveId" clId="{AE30E77A-B034-4EFF-9C84-45F53A6DE982}" dt="2020-04-06T19:51:51.332" v="74" actId="47"/>
-        <pc:sldMkLst>
-          <pc:docMk/>
-          <pc:sldMk cId="41989243" sldId="283"/>
-        </pc:sldMkLst>
-      </pc:sldChg>
-      <pc:sldChg chg="addSp delSp modSp add mod">
-        <pc:chgData name="Magnus Ahlkvist" userId="ada356d894bd2de7" providerId="LiveId" clId="{AE30E77A-B034-4EFF-9C84-45F53A6DE982}" dt="2020-04-06T20:44:19.082" v="1185" actId="14100"/>
-        <pc:sldMkLst>
-          <pc:docMk/>
-          <pc:sldMk cId="3066192018" sldId="285"/>
-        </pc:sldMkLst>
-        <pc:spChg chg="mod">
-          <ac:chgData name="Magnus Ahlkvist" userId="ada356d894bd2de7" providerId="LiveId" clId="{AE30E77A-B034-4EFF-9C84-45F53A6DE982}" dt="2020-04-06T20:07:41.740" v="916" actId="20577"/>
-          <ac:spMkLst>
-            <pc:docMk/>
-            <pc:sldMk cId="3066192018" sldId="285"/>
-            <ac:spMk id="2" creationId="{C3C68CBF-126E-4672-92BD-E421E735BEEB}"/>
-          </ac:spMkLst>
-        </pc:spChg>
-        <pc:spChg chg="del mod">
-          <ac:chgData name="Magnus Ahlkvist" userId="ada356d894bd2de7" providerId="LiveId" clId="{AE30E77A-B034-4EFF-9C84-45F53A6DE982}" dt="2020-04-06T20:41:40.603" v="1136"/>
-          <ac:spMkLst>
-            <pc:docMk/>
-            <pc:sldMk cId="3066192018" sldId="285"/>
-            <ac:spMk id="3" creationId="{C5E5A6B3-974E-4F18-A805-115C69154665}"/>
-          </ac:spMkLst>
-        </pc:spChg>
-        <pc:spChg chg="add mod">
-          <ac:chgData name="Magnus Ahlkvist" userId="ada356d894bd2de7" providerId="LiveId" clId="{AE30E77A-B034-4EFF-9C84-45F53A6DE982}" dt="2020-04-06T20:44:19.082" v="1185" actId="14100"/>
-          <ac:spMkLst>
-            <pc:docMk/>
-            <pc:sldMk cId="3066192018" sldId="285"/>
-            <ac:spMk id="6" creationId="{20083EBD-9CAC-44D3-B6CC-EB14696096B7}"/>
-          </ac:spMkLst>
-        </pc:spChg>
-        <pc:picChg chg="add mod">
-          <ac:chgData name="Magnus Ahlkvist" userId="ada356d894bd2de7" providerId="LiveId" clId="{AE30E77A-B034-4EFF-9C84-45F53A6DE982}" dt="2020-04-06T20:41:48.466" v="1139" actId="1076"/>
-          <ac:picMkLst>
-            <pc:docMk/>
-            <pc:sldMk cId="3066192018" sldId="285"/>
-            <ac:picMk id="5" creationId="{FFBB1DD4-A052-46B7-AB00-EA35FCCF3A26}"/>
-          </ac:picMkLst>
-        </pc:picChg>
-      </pc:sldChg>
-      <pc:sldChg chg="addSp delSp modSp add mod">
-        <pc:chgData name="Magnus Ahlkvist" userId="ada356d894bd2de7" providerId="LiveId" clId="{AE30E77A-B034-4EFF-9C84-45F53A6DE982}" dt="2020-04-06T20:11:50.811" v="1135" actId="20577"/>
-        <pc:sldMkLst>
-          <pc:docMk/>
-          <pc:sldMk cId="3654011242" sldId="286"/>
-        </pc:sldMkLst>
-        <pc:spChg chg="mod">
-          <ac:chgData name="Magnus Ahlkvist" userId="ada356d894bd2de7" providerId="LiveId" clId="{AE30E77A-B034-4EFF-9C84-45F53A6DE982}" dt="2020-04-06T20:10:28.677" v="1046" actId="20577"/>
-          <ac:spMkLst>
-            <pc:docMk/>
-            <pc:sldMk cId="3654011242" sldId="286"/>
-            <ac:spMk id="2" creationId="{DF035DBA-691F-4721-896A-CAEA20A027DA}"/>
-          </ac:spMkLst>
-        </pc:spChg>
-        <pc:spChg chg="add del">
-          <ac:chgData name="Magnus Ahlkvist" userId="ada356d894bd2de7" providerId="LiveId" clId="{AE30E77A-B034-4EFF-9C84-45F53A6DE982}" dt="2020-04-06T20:11:21.476" v="1065" actId="931"/>
-          <ac:spMkLst>
-            <pc:docMk/>
-            <pc:sldMk cId="3654011242" sldId="286"/>
-            <ac:spMk id="3" creationId="{84FD6EC7-775E-4167-A2C0-3AB509AC7DC0}"/>
-          </ac:spMkLst>
-        </pc:spChg>
-        <pc:spChg chg="add del mod">
-          <ac:chgData name="Magnus Ahlkvist" userId="ada356d894bd2de7" providerId="LiveId" clId="{AE30E77A-B034-4EFF-9C84-45F53A6DE982}" dt="2020-04-06T20:11:50.811" v="1135" actId="20577"/>
-          <ac:spMkLst>
-            <pc:docMk/>
-            <pc:sldMk cId="3654011242" sldId="286"/>
-            <ac:spMk id="6" creationId="{1BAD3EB1-4924-47AE-984B-646272857433}"/>
-          </ac:spMkLst>
-        </pc:spChg>
-        <pc:picChg chg="add del mod">
-          <ac:chgData name="Magnus Ahlkvist" userId="ada356d894bd2de7" providerId="LiveId" clId="{AE30E77A-B034-4EFF-9C84-45F53A6DE982}" dt="2020-04-06T20:11:21.476" v="1065" actId="931"/>
-          <ac:picMkLst>
-            <pc:docMk/>
-            <pc:sldMk cId="3654011242" sldId="286"/>
-            <ac:picMk id="5" creationId="{E54B2FB3-EFD3-4B9B-A075-A2DDBF92EF99}"/>
-          </ac:picMkLst>
-        </pc:picChg>
-      </pc:sldChg>
-    </pc:docChg>
-  </pc:docChgLst>
-  <pc:docChgLst>
-    <pc:chgData name="Magnus Ahlkvist" userId="ada356d894bd2de7" providerId="LiveId" clId="{1A8E3A2A-DA26-4BD2-A1EB-5BAE0A274B92}"/>
-    <pc:docChg chg="addSld modSld">
-      <pc:chgData name="Magnus Ahlkvist" userId="ada356d894bd2de7" providerId="LiveId" clId="{1A8E3A2A-DA26-4BD2-A1EB-5BAE0A274B92}" dt="2019-10-13T10:28:43.466" v="263" actId="20577"/>
-      <pc:docMkLst>
-        <pc:docMk/>
-      </pc:docMkLst>
-      <pc:sldChg chg="modSp modAnim">
-        <pc:chgData name="Magnus Ahlkvist" userId="ada356d894bd2de7" providerId="LiveId" clId="{1A8E3A2A-DA26-4BD2-A1EB-5BAE0A274B92}" dt="2019-10-13T08:49:51.700" v="210" actId="20577"/>
-        <pc:sldMkLst>
-          <pc:docMk/>
-          <pc:sldMk cId="6683241" sldId="257"/>
-        </pc:sldMkLst>
-        <pc:spChg chg="mod">
-          <ac:chgData name="Magnus Ahlkvist" userId="ada356d894bd2de7" providerId="LiveId" clId="{1A8E3A2A-DA26-4BD2-A1EB-5BAE0A274B92}" dt="2019-10-13T08:47:48.033" v="59" actId="20577"/>
-          <ac:spMkLst>
-            <pc:docMk/>
-            <pc:sldMk cId="6683241" sldId="257"/>
-            <ac:spMk id="2" creationId="{00000000-0000-0000-0000-000000000000}"/>
-          </ac:spMkLst>
-        </pc:spChg>
-        <pc:spChg chg="mod">
-          <ac:chgData name="Magnus Ahlkvist" userId="ada356d894bd2de7" providerId="LiveId" clId="{1A8E3A2A-DA26-4BD2-A1EB-5BAE0A274B92}" dt="2019-10-13T08:49:51.700" v="210" actId="20577"/>
-          <ac:spMkLst>
-            <pc:docMk/>
-            <pc:sldMk cId="6683241" sldId="257"/>
-            <ac:spMk id="3" creationId="{00000000-0000-0000-0000-000000000000}"/>
-          </ac:spMkLst>
-        </pc:spChg>
-      </pc:sldChg>
-      <pc:sldChg chg="modSp">
-        <pc:chgData name="Magnus Ahlkvist" userId="ada356d894bd2de7" providerId="LiveId" clId="{1A8E3A2A-DA26-4BD2-A1EB-5BAE0A274B92}" dt="2019-10-13T08:47:38.171" v="52" actId="20577"/>
-        <pc:sldMkLst>
-          <pc:docMk/>
-          <pc:sldMk cId="1847188119" sldId="260"/>
-        </pc:sldMkLst>
-        <pc:spChg chg="mod">
-          <ac:chgData name="Magnus Ahlkvist" userId="ada356d894bd2de7" providerId="LiveId" clId="{1A8E3A2A-DA26-4BD2-A1EB-5BAE0A274B92}" dt="2019-10-13T08:47:30.985" v="37" actId="20577"/>
-          <ac:spMkLst>
-            <pc:docMk/>
-            <pc:sldMk cId="1847188119" sldId="260"/>
-            <ac:spMk id="2" creationId="{3A9EEC31-E066-4E62-BAAB-C170893FFE25}"/>
-          </ac:spMkLst>
-        </pc:spChg>
-        <pc:spChg chg="mod">
-          <ac:chgData name="Magnus Ahlkvist" userId="ada356d894bd2de7" providerId="LiveId" clId="{1A8E3A2A-DA26-4BD2-A1EB-5BAE0A274B92}" dt="2019-10-13T08:47:38.171" v="52" actId="20577"/>
-          <ac:spMkLst>
-            <pc:docMk/>
-            <pc:sldMk cId="1847188119" sldId="260"/>
-            <ac:spMk id="3" creationId="{FB9B0E28-205D-4B8D-B72F-75D77CF2161D}"/>
-          </ac:spMkLst>
-        </pc:spChg>
-      </pc:sldChg>
-      <pc:sldChg chg="modSp add">
-        <pc:chgData name="Magnus Ahlkvist" userId="ada356d894bd2de7" providerId="LiveId" clId="{1A8E3A2A-DA26-4BD2-A1EB-5BAE0A274B92}" dt="2019-10-13T10:28:43.466" v="263" actId="20577"/>
-        <pc:sldMkLst>
-          <pc:docMk/>
-          <pc:sldMk cId="7591363" sldId="261"/>
-        </pc:sldMkLst>
-        <pc:spChg chg="mod">
-          <ac:chgData name="Magnus Ahlkvist" userId="ada356d894bd2de7" providerId="LiveId" clId="{1A8E3A2A-DA26-4BD2-A1EB-5BAE0A274B92}" dt="2019-10-13T10:28:29.377" v="227" actId="20577"/>
-          <ac:spMkLst>
-            <pc:docMk/>
-            <pc:sldMk cId="7591363" sldId="261"/>
-            <ac:spMk id="2" creationId="{70C438DB-20F7-4B34-8E2C-4BF45E7293A3}"/>
-          </ac:spMkLst>
-        </pc:spChg>
-        <pc:spChg chg="mod">
-          <ac:chgData name="Magnus Ahlkvist" userId="ada356d894bd2de7" providerId="LiveId" clId="{1A8E3A2A-DA26-4BD2-A1EB-5BAE0A274B92}" dt="2019-10-13T10:28:43.466" v="263" actId="20577"/>
-          <ac:spMkLst>
-            <pc:docMk/>
-            <pc:sldMk cId="7591363" sldId="261"/>
-            <ac:spMk id="3" creationId="{3308BB25-8932-48AF-AEB6-FF932D5D492F}"/>
-          </ac:spMkLst>
-        </pc:spChg>
-      </pc:sldChg>
-    </pc:docChg>
-  </pc:docChgLst>
-  <pc:docChgLst>
     <pc:chgData name="Magnus Ahlkvist" userId="ada356d894bd2de7" providerId="LiveId" clId="{B3FEF6FE-84D3-4D8A-ADA4-DBA17E73CE0D}"/>
     <pc:docChg chg="custSel addSld delSld modSld">
       <pc:chgData name="Magnus Ahlkvist" userId="ada356d894bd2de7" providerId="LiveId" clId="{B3FEF6FE-84D3-4D8A-ADA4-DBA17E73CE0D}" dt="2019-10-24T09:02:08.513" v="172" actId="313"/>
@@ -1403,7 +1397,7 @@
           <a:p>
             <a:fld id="{896D3B2D-3924-0B48-B558-93C031AA9A06}" type="datetimeFigureOut">
               <a:rPr lang="en-US" smtClean="0"/>
-              <a:t>4/6/2020</a:t>
+              <a:t>4/15/2020</a:t>
             </a:fld>
             <a:endParaRPr lang="en-US"/>
           </a:p>
@@ -1670,188 +1664,6 @@
 </p:notesMaster>
 </file>
 
-<file path=ppt/notesSlides/notesSlide1.xml><?xml version="1.0" encoding="utf-8"?>
-<p:notes xmlns:a="http://schemas.openxmlformats.org/drawingml/2006/main" xmlns:r="http://schemas.openxmlformats.org/officeDocument/2006/relationships" xmlns:p="http://schemas.openxmlformats.org/presentationml/2006/main">
-  <p:cSld>
-    <p:spTree>
-      <p:nvGrpSpPr>
-        <p:cNvPr id="1" name=""/>
-        <p:cNvGrpSpPr/>
-        <p:nvPr/>
-      </p:nvGrpSpPr>
-      <p:grpSpPr>
-        <a:xfrm>
-          <a:off x="0" y="0"/>
-          <a:ext cx="0" cy="0"/>
-          <a:chOff x="0" y="0"/>
-          <a:chExt cx="0" cy="0"/>
-        </a:xfrm>
-      </p:grpSpPr>
-      <p:sp>
-        <p:nvSpPr>
-          <p:cNvPr id="2" name="Platshållare för bildobjekt 1"/>
-          <p:cNvSpPr>
-            <a:spLocks noGrp="1" noRot="1" noChangeAspect="1"/>
-          </p:cNvSpPr>
-          <p:nvPr>
-            <p:ph type="sldImg"/>
-          </p:nvPr>
-        </p:nvSpPr>
-        <p:spPr/>
-      </p:sp>
-      <p:sp>
-        <p:nvSpPr>
-          <p:cNvPr id="3" name="Platshållare för anteckningar 2"/>
-          <p:cNvSpPr>
-            <a:spLocks noGrp="1"/>
-          </p:cNvSpPr>
-          <p:nvPr>
-            <p:ph type="body" idx="1"/>
-          </p:nvPr>
-        </p:nvSpPr>
-        <p:spPr/>
-        <p:txBody>
-          <a:bodyPr/>
-          <a:lstStyle/>
-          <a:p>
-            <a:r>
-              <a:rPr lang="sv-SE" dirty="0" err="1"/>
-              <a:t>Parameterize</a:t>
-            </a:r>
-            <a:endParaRPr lang="sv-SE" dirty="0"/>
-          </a:p>
-          <a:p>
-            <a:r>
-              <a:rPr lang="sv-SE" dirty="0"/>
-              <a:t>Get the </a:t>
-            </a:r>
-            <a:r>
-              <a:rPr lang="sv-SE" dirty="0" err="1"/>
-              <a:t>value</a:t>
-            </a:r>
-            <a:r>
-              <a:rPr lang="sv-SE" dirty="0"/>
-              <a:t> from a table in the DB</a:t>
-            </a:r>
-          </a:p>
-          <a:p>
-            <a:r>
-              <a:rPr lang="sv-SE" dirty="0" err="1"/>
-              <a:t>Trace</a:t>
-            </a:r>
-            <a:r>
-              <a:rPr lang="sv-SE" dirty="0"/>
-              <a:t> Flags handling </a:t>
-            </a:r>
-            <a:r>
-              <a:rPr lang="sv-SE" dirty="0" err="1"/>
-              <a:t>ascending</a:t>
-            </a:r>
-            <a:r>
-              <a:rPr lang="sv-SE" dirty="0"/>
-              <a:t> </a:t>
-            </a:r>
-            <a:r>
-              <a:rPr lang="sv-SE" dirty="0" err="1"/>
-              <a:t>key</a:t>
-            </a:r>
-            <a:r>
-              <a:rPr lang="sv-SE" dirty="0"/>
-              <a:t> problem</a:t>
-            </a:r>
-          </a:p>
-          <a:p>
-            <a:r>
-              <a:rPr lang="sv-SE" dirty="0" err="1"/>
-              <a:t>Update</a:t>
-            </a:r>
-            <a:r>
-              <a:rPr lang="sv-SE" dirty="0"/>
-              <a:t> </a:t>
-            </a:r>
-            <a:r>
-              <a:rPr lang="sv-SE" dirty="0" err="1"/>
-              <a:t>statistics</a:t>
-            </a:r>
-            <a:r>
-              <a:rPr lang="sv-SE" dirty="0"/>
-              <a:t> and/or </a:t>
-            </a:r>
-            <a:r>
-              <a:rPr lang="sv-SE" dirty="0" err="1"/>
-              <a:t>rebuild</a:t>
-            </a:r>
-            <a:r>
-              <a:rPr lang="sv-SE" dirty="0"/>
-              <a:t> index</a:t>
-            </a:r>
-          </a:p>
-          <a:p>
-            <a:r>
-              <a:rPr lang="sv-SE" dirty="0" err="1"/>
-              <a:t>Upgrade</a:t>
-            </a:r>
-            <a:endParaRPr lang="sv-SE" dirty="0"/>
-          </a:p>
-          <a:p>
-            <a:r>
-              <a:rPr lang="sv-SE" dirty="0"/>
-              <a:t>Partition</a:t>
-            </a:r>
-          </a:p>
-          <a:p>
-            <a:r>
-              <a:rPr lang="sv-SE" dirty="0" err="1"/>
-              <a:t>Optimize</a:t>
-            </a:r>
-            <a:r>
-              <a:rPr lang="sv-SE" dirty="0"/>
-              <a:t> for </a:t>
-            </a:r>
-            <a:r>
-              <a:rPr lang="sv-SE" dirty="0" err="1"/>
-              <a:t>unknown</a:t>
-            </a:r>
-            <a:endParaRPr lang="sv-SE" dirty="0"/>
-          </a:p>
-        </p:txBody>
-      </p:sp>
-      <p:sp>
-        <p:nvSpPr>
-          <p:cNvPr id="4" name="Platshållare för bildnummer 3"/>
-          <p:cNvSpPr>
-            <a:spLocks noGrp="1"/>
-          </p:cNvSpPr>
-          <p:nvPr>
-            <p:ph type="sldNum" sz="quarter" idx="5"/>
-          </p:nvPr>
-        </p:nvSpPr>
-        <p:spPr/>
-        <p:txBody>
-          <a:bodyPr/>
-          <a:lstStyle/>
-          <a:p>
-            <a:fld id="{BF44D877-D18B-47F4-85A9-8D3AAA36BF88}" type="slidenum">
-              <a:rPr lang="sv-SE" smtClean="0"/>
-              <a:t>16</a:t>
-            </a:fld>
-            <a:endParaRPr lang="sv-SE"/>
-          </a:p>
-        </p:txBody>
-      </p:sp>
-    </p:spTree>
-    <p:extLst>
-      <p:ext uri="{BB962C8B-B14F-4D97-AF65-F5344CB8AC3E}">
-        <p14:creationId xmlns:p14="http://schemas.microsoft.com/office/powerpoint/2010/main" val="165323436"/>
-      </p:ext>
-    </p:extLst>
-  </p:cSld>
-  <p:clrMapOvr>
-    <a:masterClrMapping/>
-  </p:clrMapOvr>
-</p:notes>
-</file>
-
 <file path=ppt/slideLayouts/slideLayout1.xml><?xml version="1.0" encoding="utf-8"?>
 <p:sldLayout xmlns:a="http://schemas.openxmlformats.org/drawingml/2006/main" xmlns:r="http://schemas.openxmlformats.org/officeDocument/2006/relationships" xmlns:p="http://schemas.openxmlformats.org/presentationml/2006/main" showMasterSp="0" type="title" preserve="1">
   <p:cSld name="Rubrikbild">
@@ -2045,7 +1857,7 @@
             <a:fld id="{B61BEF0D-F0BB-DE4B-95CE-6DB70DBA9567}" type="datetimeFigureOut">
               <a:rPr lang="en-US"/>
               <a:pPr/>
-              <a:t>4/6/2020</a:t>
+              <a:t>4/15/2020</a:t>
             </a:fld>
             <a:endParaRPr lang="en-US"/>
           </a:p>
@@ -2329,7 +2141,7 @@
             <a:fld id="{B61BEF0D-F0BB-DE4B-95CE-6DB70DBA9567}" type="datetimeFigureOut">
               <a:rPr lang="en-US"/>
               <a:pPr/>
-              <a:t>4/6/2020</a:t>
+              <a:t>4/15/2020</a:t>
             </a:fld>
             <a:endParaRPr lang="en-US"/>
           </a:p>
@@ -2640,7 +2452,7 @@
             <a:fld id="{B61BEF0D-F0BB-DE4B-95CE-6DB70DBA9567}" type="datetimeFigureOut">
               <a:rPr lang="en-US"/>
               <a:pPr/>
-              <a:t>4/6/2020</a:t>
+              <a:t>4/15/2020</a:t>
             </a:fld>
             <a:endParaRPr lang="en-US"/>
           </a:p>
@@ -2978,7 +2790,7 @@
             <a:fld id="{B61BEF0D-F0BB-DE4B-95CE-6DB70DBA9567}" type="datetimeFigureOut">
               <a:rPr lang="en-US"/>
               <a:pPr/>
-              <a:t>4/6/2020</a:t>
+              <a:t>4/15/2020</a:t>
             </a:fld>
             <a:endParaRPr lang="en-US"/>
           </a:p>
@@ -3289,7 +3101,7 @@
             <a:fld id="{B61BEF0D-F0BB-DE4B-95CE-6DB70DBA9567}" type="datetimeFigureOut">
               <a:rPr lang="en-US"/>
               <a:pPr/>
-              <a:t>4/6/2020</a:t>
+              <a:t>4/15/2020</a:t>
             </a:fld>
             <a:endParaRPr lang="en-US"/>
           </a:p>
@@ -3679,7 +3491,7 @@
             <a:fld id="{B61BEF0D-F0BB-DE4B-95CE-6DB70DBA9567}" type="datetimeFigureOut">
               <a:rPr lang="en-US"/>
               <a:pPr/>
-              <a:t>4/6/2020</a:t>
+              <a:t>4/15/2020</a:t>
             </a:fld>
             <a:endParaRPr lang="en-US"/>
           </a:p>
@@ -3845,7 +3657,7 @@
           <a:p>
             <a:fld id="{55C6B4A9-1611-4792-9094-5F34BCA07E0B}" type="datetimeFigureOut">
               <a:rPr lang="en-US"/>
-              <a:t>4/6/2020</a:t>
+              <a:t>4/15/2020</a:t>
             </a:fld>
             <a:endParaRPr lang="en-US"/>
           </a:p>
@@ -4021,7 +3833,7 @@
             <a:fld id="{B61BEF0D-F0BB-DE4B-95CE-6DB70DBA9567}" type="datetimeFigureOut">
               <a:rPr lang="en-US"/>
               <a:pPr/>
-              <a:t>4/6/2020</a:t>
+              <a:t>4/15/2020</a:t>
             </a:fld>
             <a:endParaRPr lang="en-US"/>
           </a:p>
@@ -4225,7 +4037,7 @@
           <a:p>
             <a:fld id="{C2231AF4-6FC1-4460-BBC9-D7CD0B6E11EF}" type="datetimeFigureOut">
               <a:rPr lang="sv-SE" smtClean="0"/>
-              <a:t>2020-04-06</a:t>
+              <a:t>2020-04-15</a:t>
             </a:fld>
             <a:endParaRPr lang="sv-SE"/>
           </a:p>
@@ -4423,7 +4235,7 @@
           <a:p>
             <a:fld id="{C2231AF4-6FC1-4460-BBC9-D7CD0B6E11EF}" type="datetimeFigureOut">
               <a:rPr lang="sv-SE" smtClean="0"/>
-              <a:t>2020-04-06</a:t>
+              <a:t>2020-04-15</a:t>
             </a:fld>
             <a:endParaRPr lang="sv-SE"/>
           </a:p>
@@ -4698,7 +4510,7 @@
           <a:p>
             <a:fld id="{C2231AF4-6FC1-4460-BBC9-D7CD0B6E11EF}" type="datetimeFigureOut">
               <a:rPr lang="sv-SE" smtClean="0"/>
-              <a:t>2020-04-06</a:t>
+              <a:t>2020-04-15</a:t>
             </a:fld>
             <a:endParaRPr lang="sv-SE"/>
           </a:p>
@@ -4887,7 +4699,7 @@
             <a:fld id="{B61BEF0D-F0BB-DE4B-95CE-6DB70DBA9567}" type="datetimeFigureOut">
               <a:rPr lang="en-US"/>
               <a:pPr/>
-              <a:t>4/6/2020</a:t>
+              <a:t>4/15/2020</a:t>
             </a:fld>
             <a:endParaRPr lang="en-US"/>
           </a:p>
@@ -5136,7 +4948,7 @@
           <a:p>
             <a:fld id="{C2231AF4-6FC1-4460-BBC9-D7CD0B6E11EF}" type="datetimeFigureOut">
               <a:rPr lang="sv-SE" smtClean="0"/>
-              <a:t>2020-04-06</a:t>
+              <a:t>2020-04-15</a:t>
             </a:fld>
             <a:endParaRPr lang="sv-SE"/>
           </a:p>
@@ -5548,7 +5360,7 @@
           <a:p>
             <a:fld id="{C2231AF4-6FC1-4460-BBC9-D7CD0B6E11EF}" type="datetimeFigureOut">
               <a:rPr lang="sv-SE" smtClean="0"/>
-              <a:t>2020-04-06</a:t>
+              <a:t>2020-04-15</a:t>
             </a:fld>
             <a:endParaRPr lang="sv-SE"/>
           </a:p>
@@ -5689,7 +5501,7 @@
           <a:p>
             <a:fld id="{C2231AF4-6FC1-4460-BBC9-D7CD0B6E11EF}" type="datetimeFigureOut">
               <a:rPr lang="sv-SE" smtClean="0"/>
-              <a:t>2020-04-06</a:t>
+              <a:t>2020-04-15</a:t>
             </a:fld>
             <a:endParaRPr lang="sv-SE"/>
           </a:p>
@@ -5802,7 +5614,7 @@
           <a:p>
             <a:fld id="{C2231AF4-6FC1-4460-BBC9-D7CD0B6E11EF}" type="datetimeFigureOut">
               <a:rPr lang="sv-SE" smtClean="0"/>
-              <a:t>2020-04-06</a:t>
+              <a:t>2020-04-15</a:t>
             </a:fld>
             <a:endParaRPr lang="sv-SE"/>
           </a:p>
@@ -6113,7 +5925,7 @@
           <a:p>
             <a:fld id="{C2231AF4-6FC1-4460-BBC9-D7CD0B6E11EF}" type="datetimeFigureOut">
               <a:rPr lang="sv-SE" smtClean="0"/>
-              <a:t>2020-04-06</a:t>
+              <a:t>2020-04-15</a:t>
             </a:fld>
             <a:endParaRPr lang="sv-SE"/>
           </a:p>
@@ -6401,7 +6213,7 @@
           <a:p>
             <a:fld id="{C2231AF4-6FC1-4460-BBC9-D7CD0B6E11EF}" type="datetimeFigureOut">
               <a:rPr lang="sv-SE" smtClean="0"/>
-              <a:t>2020-04-06</a:t>
+              <a:t>2020-04-15</a:t>
             </a:fld>
             <a:endParaRPr lang="sv-SE"/>
           </a:p>
@@ -6599,7 +6411,7 @@
           <a:p>
             <a:fld id="{C2231AF4-6FC1-4460-BBC9-D7CD0B6E11EF}" type="datetimeFigureOut">
               <a:rPr lang="sv-SE" smtClean="0"/>
-              <a:t>2020-04-06</a:t>
+              <a:t>2020-04-15</a:t>
             </a:fld>
             <a:endParaRPr lang="sv-SE"/>
           </a:p>
@@ -6807,7 +6619,7 @@
           <a:p>
             <a:fld id="{C2231AF4-6FC1-4460-BBC9-D7CD0B6E11EF}" type="datetimeFigureOut">
               <a:rPr lang="sv-SE" smtClean="0"/>
-              <a:t>2020-04-06</a:t>
+              <a:t>2020-04-15</a:t>
             </a:fld>
             <a:endParaRPr lang="sv-SE"/>
           </a:p>
@@ -7067,7 +6879,7 @@
             <a:fld id="{B61BEF0D-F0BB-DE4B-95CE-6DB70DBA9567}" type="datetimeFigureOut">
               <a:rPr lang="en-US"/>
               <a:pPr/>
-              <a:t>4/6/2020</a:t>
+              <a:t>4/15/2020</a:t>
             </a:fld>
             <a:endParaRPr lang="en-US"/>
           </a:p>
@@ -7295,7 +7107,7 @@
           <a:p>
             <a:fld id="{EB712588-04B1-427B-82EE-E8DB90309F08}" type="datetimeFigureOut">
               <a:rPr lang="en-US"/>
-              <a:t>4/6/2020</a:t>
+              <a:t>4/15/2020</a:t>
             </a:fld>
             <a:endParaRPr lang="en-US"/>
           </a:p>
@@ -7665,7 +7477,7 @@
             <a:fld id="{B61BEF0D-F0BB-DE4B-95CE-6DB70DBA9567}" type="datetimeFigureOut">
               <a:rPr lang="en-US"/>
               <a:pPr/>
-              <a:t>4/6/2020</a:t>
+              <a:t>4/15/2020</a:t>
             </a:fld>
             <a:endParaRPr lang="en-US"/>
           </a:p>
@@ -7785,7 +7597,7 @@
             <a:fld id="{B61BEF0D-F0BB-DE4B-95CE-6DB70DBA9567}" type="datetimeFigureOut">
               <a:rPr lang="en-US"/>
               <a:pPr/>
-              <a:t>4/6/2020</a:t>
+              <a:t>4/15/2020</a:t>
             </a:fld>
             <a:endParaRPr lang="en-US"/>
           </a:p>
@@ -7877,7 +7689,7 @@
             <a:fld id="{B61BEF0D-F0BB-DE4B-95CE-6DB70DBA9567}" type="datetimeFigureOut">
               <a:rPr lang="en-US"/>
               <a:pPr/>
-              <a:t>4/6/2020</a:t>
+              <a:t>4/15/2020</a:t>
             </a:fld>
             <a:endParaRPr lang="en-US"/>
           </a:p>
@@ -8128,7 +7940,7 @@
           <a:p>
             <a:fld id="{42A54C80-263E-416B-A8E0-580EDEADCBDC}" type="datetimeFigureOut">
               <a:rPr lang="en-US"/>
-              <a:t>4/6/2020</a:t>
+              <a:t>4/15/2020</a:t>
             </a:fld>
             <a:endParaRPr lang="en-US"/>
           </a:p>
@@ -8387,7 +8199,7 @@
             <a:fld id="{B61BEF0D-F0BB-DE4B-95CE-6DB70DBA9567}" type="datetimeFigureOut">
               <a:rPr lang="en-US"/>
               <a:pPr/>
-              <a:t>4/6/2020</a:t>
+              <a:t>4/15/2020</a:t>
             </a:fld>
             <a:endParaRPr lang="en-US"/>
           </a:p>
@@ -8612,7 +8424,7 @@
             <a:fld id="{B61BEF0D-F0BB-DE4B-95CE-6DB70DBA9567}" type="datetimeFigureOut">
               <a:rPr lang="en-US"/>
               <a:pPr/>
-              <a:t>4/6/2020</a:t>
+              <a:t>4/15/2020</a:t>
             </a:fld>
             <a:endParaRPr lang="en-US"/>
           </a:p>
@@ -9319,7 +9131,7 @@
           <a:p>
             <a:fld id="{C2231AF4-6FC1-4460-BBC9-D7CD0B6E11EF}" type="datetimeFigureOut">
               <a:rPr lang="sv-SE" smtClean="0"/>
-              <a:t>2020-04-06</a:t>
+              <a:t>2020-04-15</a:t>
             </a:fld>
             <a:endParaRPr lang="sv-SE"/>
           </a:p>
@@ -9755,7 +9567,7 @@
         <p:spPr>
           <a:xfrm>
             <a:off x="677334" y="4800600"/>
-            <a:ext cx="8596667" cy="819150"/>
+            <a:ext cx="9092308" cy="819150"/>
           </a:xfrm>
         </p:spPr>
         <p:txBody>
@@ -9875,7 +9687,15 @@
             </a:r>
             <a:r>
               <a:rPr lang="en-US" dirty="0"/>
-              <a:t> </a:t>
+              <a:t> | github.com/</a:t>
+            </a:r>
+            <a:r>
+              <a:rPr lang="en-US" dirty="0" err="1"/>
+              <a:t>transmokopter</a:t>
+            </a:r>
+            <a:r>
+              <a:rPr lang="en-US" dirty="0"/>
+              <a:t>/Presentations</a:t>
             </a:r>
           </a:p>
           <a:p>
@@ -9926,10 +9746,10 @@
       </p:grpSpPr>
       <p:sp>
         <p:nvSpPr>
-          <p:cNvPr id="5" name="Rubrik 4">
+          <p:cNvPr id="4" name="Rubrik 3">
             <a:extLst>
               <a:ext uri="{FF2B5EF4-FFF2-40B4-BE49-F238E27FC236}">
-                <a16:creationId xmlns:a16="http://schemas.microsoft.com/office/drawing/2014/main" id="{4B54807A-4D7E-49ED-817B-020A62F1C074}"/>
+                <a16:creationId xmlns:a16="http://schemas.microsoft.com/office/drawing/2014/main" id="{B815B6F0-441C-4C91-AB08-6E805A1963BC}"/>
               </a:ext>
             </a:extLst>
           </p:cNvPr>
@@ -9937,7 +9757,7 @@
             <a:spLocks noGrp="1"/>
           </p:cNvSpPr>
           <p:nvPr>
-            <p:ph type="title"/>
+            <p:ph type="ctrTitle"/>
           </p:nvPr>
         </p:nvSpPr>
         <p:spPr/>
@@ -9946,190 +9766,23 @@
           <a:lstStyle/>
           <a:p>
             <a:r>
-              <a:rPr lang="sv-SE" dirty="0" err="1"/>
-              <a:t>Some</a:t>
-            </a:r>
-            <a:r>
               <a:rPr lang="sv-SE" dirty="0"/>
-              <a:t> plan </a:t>
-            </a:r>
-            <a:r>
-              <a:rPr lang="sv-SE" dirty="0" err="1"/>
-              <a:t>characteristics</a:t>
-            </a:r>
-            <a:endParaRPr lang="sv-SE" dirty="0"/>
-          </a:p>
-        </p:txBody>
-      </p:sp>
-      <p:pic>
-        <p:nvPicPr>
-          <p:cNvPr id="4" name="Platshållare för innehåll 3">
-            <a:extLst>
-              <a:ext uri="{FF2B5EF4-FFF2-40B4-BE49-F238E27FC236}">
-                <a16:creationId xmlns:a16="http://schemas.microsoft.com/office/drawing/2014/main" id="{A8ACA15F-E703-49DA-9042-57B14E250DA5}"/>
-              </a:ext>
-            </a:extLst>
-          </p:cNvPr>
-          <p:cNvPicPr>
-            <a:picLocks noGrp="1" noChangeAspect="1"/>
-          </p:cNvPicPr>
-          <p:nvPr>
-            <p:ph sz="half" idx="1"/>
-          </p:nvPr>
-        </p:nvPicPr>
-        <p:blipFill>
-          <a:blip r:embed="rId2"/>
-          <a:stretch>
-            <a:fillRect/>
-          </a:stretch>
-        </p:blipFill>
-        <p:spPr>
-          <a:xfrm>
-            <a:off x="330781" y="2322623"/>
-            <a:ext cx="3048425" cy="3296110"/>
-          </a:xfrm>
-          <a:prstGeom prst="rect">
-            <a:avLst/>
-          </a:prstGeom>
-        </p:spPr>
-      </p:pic>
-      <p:pic>
-        <p:nvPicPr>
-          <p:cNvPr id="7" name="Platshållare för innehåll 6">
-            <a:extLst>
-              <a:ext uri="{FF2B5EF4-FFF2-40B4-BE49-F238E27FC236}">
-                <a16:creationId xmlns:a16="http://schemas.microsoft.com/office/drawing/2014/main" id="{8D56BF16-34A1-43D4-88E1-CD4815BF2EF8}"/>
-              </a:ext>
-            </a:extLst>
-          </p:cNvPr>
-          <p:cNvPicPr>
-            <a:picLocks noGrp="1" noChangeAspect="1"/>
-          </p:cNvPicPr>
-          <p:nvPr>
-            <p:ph sz="half" idx="2"/>
-          </p:nvPr>
-        </p:nvPicPr>
-        <p:blipFill>
-          <a:blip r:embed="rId3"/>
-          <a:stretch>
-            <a:fillRect/>
-          </a:stretch>
-        </p:blipFill>
-        <p:spPr>
-          <a:xfrm>
-            <a:off x="3656692" y="2322623"/>
-            <a:ext cx="8339142" cy="2531260"/>
-          </a:xfrm>
-          <a:prstGeom prst="rect">
-            <a:avLst/>
-          </a:prstGeom>
-        </p:spPr>
-      </p:pic>
-      <p:pic>
-        <p:nvPicPr>
-          <p:cNvPr id="8" name="Bildobjekt 7">
-            <a:extLst>
-              <a:ext uri="{FF2B5EF4-FFF2-40B4-BE49-F238E27FC236}">
-                <a16:creationId xmlns:a16="http://schemas.microsoft.com/office/drawing/2014/main" id="{CE7272E4-352A-4105-A9F4-F162EA00B816}"/>
-              </a:ext>
-            </a:extLst>
-          </p:cNvPr>
-          <p:cNvPicPr>
-            <a:picLocks noChangeAspect="1"/>
-          </p:cNvPicPr>
-          <p:nvPr/>
-        </p:nvPicPr>
-        <p:blipFill>
-          <a:blip r:embed="rId4"/>
-          <a:stretch>
-            <a:fillRect/>
-          </a:stretch>
-        </p:blipFill>
-        <p:spPr>
-          <a:xfrm>
-            <a:off x="7223143" y="1836780"/>
-            <a:ext cx="4772691" cy="485843"/>
-          </a:xfrm>
-          <a:prstGeom prst="rect">
-            <a:avLst/>
-          </a:prstGeom>
-        </p:spPr>
-      </p:pic>
-      <p:sp>
-        <p:nvSpPr>
-          <p:cNvPr id="9" name="textruta 8">
-            <a:extLst>
-              <a:ext uri="{FF2B5EF4-FFF2-40B4-BE49-F238E27FC236}">
-                <a16:creationId xmlns:a16="http://schemas.microsoft.com/office/drawing/2014/main" id="{F8F6D32D-2386-4EC1-99DA-88C81C408104}"/>
-              </a:ext>
-            </a:extLst>
-          </p:cNvPr>
-          <p:cNvSpPr txBox="1"/>
-          <p:nvPr/>
-        </p:nvSpPr>
-        <p:spPr>
-          <a:xfrm>
-            <a:off x="330781" y="1980054"/>
-            <a:ext cx="3048425" cy="369332"/>
-          </a:xfrm>
-          <a:prstGeom prst="rect">
-            <a:avLst/>
-          </a:prstGeom>
-          <a:noFill/>
-        </p:spPr>
-        <p:txBody>
-          <a:bodyPr wrap="square" rtlCol="0">
-            <a:spAutoFit/>
-          </a:bodyPr>
-          <a:lstStyle/>
-          <a:p>
-            <a:r>
+              <a:t>DBATOOLS</a:t>
+            </a:r>
+            <a:br>
               <a:rPr lang="sv-SE" dirty="0"/>
-              <a:t>OK</a:t>
-            </a:r>
-          </a:p>
-        </p:txBody>
-      </p:sp>
-      <p:sp>
-        <p:nvSpPr>
-          <p:cNvPr id="10" name="textruta 9">
-            <a:extLst>
-              <a:ext uri="{FF2B5EF4-FFF2-40B4-BE49-F238E27FC236}">
-                <a16:creationId xmlns:a16="http://schemas.microsoft.com/office/drawing/2014/main" id="{1EE4688A-C744-405A-BB64-5702489C2997}"/>
-              </a:ext>
-            </a:extLst>
-          </p:cNvPr>
-          <p:cNvSpPr txBox="1"/>
-          <p:nvPr/>
-        </p:nvSpPr>
-        <p:spPr>
-          <a:xfrm>
-            <a:off x="3656692" y="1980054"/>
-            <a:ext cx="3048425" cy="369332"/>
-          </a:xfrm>
-          <a:prstGeom prst="rect">
-            <a:avLst/>
-          </a:prstGeom>
-          <a:noFill/>
-        </p:spPr>
-        <p:txBody>
-          <a:bodyPr wrap="square" rtlCol="0">
-            <a:spAutoFit/>
-          </a:bodyPr>
-          <a:lstStyle/>
-          <a:p>
-            <a:r>
-              <a:rPr lang="sv-SE" dirty="0" err="1"/>
-              <a:t>Awful</a:t>
-            </a:r>
-            <a:endParaRPr lang="sv-SE" dirty="0"/>
+            </a:br>
+            <a:r>
+              <a:rPr lang="sv-SE" dirty="0"/>
+              <a:t>Demo</a:t>
+            </a:r>
           </a:p>
         </p:txBody>
       </p:sp>
     </p:spTree>
     <p:extLst>
       <p:ext uri="{BB962C8B-B14F-4D97-AF65-F5344CB8AC3E}">
-        <p14:creationId xmlns:p14="http://schemas.microsoft.com/office/powerpoint/2010/main" val="1167938610"/>
+        <p14:creationId xmlns:p14="http://schemas.microsoft.com/office/powerpoint/2010/main" val="3934740375"/>
       </p:ext>
     </p:extLst>
   </p:cSld>
@@ -10158,10 +9811,10 @@
       </p:grpSpPr>
       <p:sp>
         <p:nvSpPr>
-          <p:cNvPr id="2" name="Title 1">
+          <p:cNvPr id="2" name="Rubrik 1">
             <a:extLst>
               <a:ext uri="{FF2B5EF4-FFF2-40B4-BE49-F238E27FC236}">
-                <a16:creationId xmlns:a16="http://schemas.microsoft.com/office/drawing/2014/main" id="{3A9EEC31-E066-4E62-BAAB-C170893FFE25}"/>
+                <a16:creationId xmlns:a16="http://schemas.microsoft.com/office/drawing/2014/main" id="{86A8366E-4779-4EC4-BFA4-CB7796ECEBDD}"/>
               </a:ext>
             </a:extLst>
           </p:cNvPr>
@@ -10177,18 +9830,13 @@
           <a:bodyPr/>
           <a:lstStyle/>
           <a:p>
-            <a:pPr algn="l"/>
-            <a:r>
-              <a:rPr lang="en-US" sz="3200" dirty="0"/>
-              <a:t>Hey </a:t>
-            </a:r>
-            <a:r>
-              <a:rPr lang="en-US" sz="3200" dirty="0" err="1"/>
-              <a:t>Mr</a:t>
-            </a:r>
-            <a:r>
-              <a:rPr lang="en-US" sz="3200" dirty="0"/>
-              <a:t> DBA</a:t>
+            <a:r>
+              <a:rPr lang="sv-SE" dirty="0" err="1"/>
+              <a:t>Lets’s</a:t>
+            </a:r>
+            <a:r>
+              <a:rPr lang="sv-SE" dirty="0"/>
+              <a:t> get down to business</a:t>
             </a:r>
           </a:p>
         </p:txBody>
@@ -10198,7 +9846,7 @@
           <p:cNvPr id="3" name="Platshållare för innehåll 2">
             <a:extLst>
               <a:ext uri="{FF2B5EF4-FFF2-40B4-BE49-F238E27FC236}">
-                <a16:creationId xmlns:a16="http://schemas.microsoft.com/office/drawing/2014/main" id="{B03794EE-2867-4CBE-BF6C-BBED1C4B7EF9}"/>
+                <a16:creationId xmlns:a16="http://schemas.microsoft.com/office/drawing/2014/main" id="{E517467D-E6D8-4E68-88BB-BA3E6E56E956}"/>
               </a:ext>
             </a:extLst>
           </p:cNvPr>
@@ -10216,11 +9864,27 @@
           <a:p>
             <a:r>
               <a:rPr lang="sv-SE" dirty="0"/>
-              <a:t>Ola </a:t>
+              <a:t>Setup servers for </a:t>
             </a:r>
             <a:r>
               <a:rPr lang="sv-SE" dirty="0" err="1"/>
-              <a:t>Hallengren’s</a:t>
+              <a:t>backing</a:t>
+            </a:r>
+            <a:r>
+              <a:rPr lang="sv-SE" dirty="0"/>
+              <a:t> up to and </a:t>
+            </a:r>
+            <a:r>
+              <a:rPr lang="sv-SE" dirty="0" err="1"/>
+              <a:t>restoring</a:t>
+            </a:r>
+            <a:r>
+              <a:rPr lang="sv-SE" dirty="0"/>
+              <a:t> from </a:t>
+            </a:r>
+            <a:r>
+              <a:rPr lang="sv-SE" dirty="0" err="1"/>
+              <a:t>Azure</a:t>
             </a:r>
             <a:r>
               <a:rPr lang="sv-SE" dirty="0"/>
@@ -10228,15 +9892,28 @@
             </a:r>
             <a:r>
               <a:rPr lang="sv-SE" dirty="0" err="1"/>
-              <a:t>maintenance</a:t>
+              <a:t>blob</a:t>
             </a:r>
             <a:r>
               <a:rPr lang="sv-SE" dirty="0"/>
-              <a:t> solution, </a:t>
+              <a:t> storage</a:t>
+            </a:r>
+          </a:p>
+          <a:p>
+            <a:r>
+              <a:rPr lang="sv-SE" dirty="0"/>
+              <a:t>Install a new SQL Server </a:t>
             </a:r>
             <a:r>
               <a:rPr lang="sv-SE" dirty="0" err="1"/>
-              <a:t>run</a:t>
+              <a:t>instance</a:t>
+            </a:r>
+            <a:endParaRPr lang="sv-SE" dirty="0"/>
+          </a:p>
+          <a:p>
+            <a:r>
+              <a:rPr lang="sv-SE" dirty="0" err="1"/>
+              <a:t>Automate</a:t>
             </a:r>
             <a:r>
               <a:rPr lang="sv-SE" dirty="0"/>
@@ -10244,8 +9921,44 @@
             </a:r>
             <a:r>
               <a:rPr lang="sv-SE" dirty="0" err="1"/>
-              <a:t>nightly</a:t>
-            </a:r>
+              <a:t>patching</a:t>
+            </a:r>
+            <a:r>
+              <a:rPr lang="sv-SE" dirty="0"/>
+              <a:t> </a:t>
+            </a:r>
+            <a:r>
+              <a:rPr lang="sv-SE" dirty="0" err="1"/>
+              <a:t>of</a:t>
+            </a:r>
+            <a:r>
+              <a:rPr lang="sv-SE" dirty="0"/>
+              <a:t> SQL Server</a:t>
+            </a:r>
+          </a:p>
+          <a:p>
+            <a:r>
+              <a:rPr lang="sv-SE" dirty="0"/>
+              <a:t>Log shipping when </a:t>
+            </a:r>
+            <a:r>
+              <a:rPr lang="sv-SE" dirty="0" err="1"/>
+              <a:t>there’s</a:t>
+            </a:r>
+            <a:r>
+              <a:rPr lang="sv-SE" dirty="0"/>
+              <a:t> no common </a:t>
+            </a:r>
+            <a:r>
+              <a:rPr lang="sv-SE" dirty="0" err="1"/>
+              <a:t>file</a:t>
+            </a:r>
+            <a:r>
+              <a:rPr lang="sv-SE" dirty="0"/>
+              <a:t> share</a:t>
+            </a:r>
+          </a:p>
+          <a:p>
             <a:endParaRPr lang="sv-SE" dirty="0"/>
           </a:p>
         </p:txBody>
@@ -10253,7 +9966,7 @@
     </p:spTree>
     <p:extLst>
       <p:ext uri="{BB962C8B-B14F-4D97-AF65-F5344CB8AC3E}">
-        <p14:creationId xmlns:p14="http://schemas.microsoft.com/office/powerpoint/2010/main" val="3619597613"/>
+        <p14:creationId xmlns:p14="http://schemas.microsoft.com/office/powerpoint/2010/main" val="45941783"/>
       </p:ext>
     </p:extLst>
   </p:cSld>
@@ -10303,35 +10016,14 @@
           <a:p>
             <a:r>
               <a:rPr lang="sv-SE" dirty="0"/>
-              <a:t>DBCC SHOW_STATISTICS</a:t>
-            </a:r>
-          </a:p>
-        </p:txBody>
-      </p:sp>
-      <p:sp>
-        <p:nvSpPr>
-          <p:cNvPr id="5" name="Underrubrik 4">
-            <a:extLst>
-              <a:ext uri="{FF2B5EF4-FFF2-40B4-BE49-F238E27FC236}">
-                <a16:creationId xmlns:a16="http://schemas.microsoft.com/office/drawing/2014/main" id="{29A4EEA5-6DE3-4C78-A656-74A583DE414B}"/>
-              </a:ext>
-            </a:extLst>
-          </p:cNvPr>
-          <p:cNvSpPr>
-            <a:spLocks noGrp="1"/>
-          </p:cNvSpPr>
-          <p:nvPr>
-            <p:ph type="subTitle" idx="1"/>
-          </p:nvPr>
-        </p:nvSpPr>
-        <p:spPr/>
-        <p:txBody>
-          <a:bodyPr/>
-          <a:lstStyle/>
-          <a:p>
-            <a:r>
+              <a:t>DBATOOLS</a:t>
+            </a:r>
+            <a:br>
               <a:rPr lang="sv-SE" dirty="0"/>
-              <a:t>DEMO</a:t>
+            </a:br>
+            <a:r>
+              <a:rPr lang="sv-SE" dirty="0"/>
+              <a:t>Demo</a:t>
             </a:r>
           </a:p>
         </p:txBody>
@@ -10339,1194 +10031,7 @@
     </p:spTree>
     <p:extLst>
       <p:ext uri="{BB962C8B-B14F-4D97-AF65-F5344CB8AC3E}">
-        <p14:creationId xmlns:p14="http://schemas.microsoft.com/office/powerpoint/2010/main" val="1277576842"/>
-      </p:ext>
-    </p:extLst>
-  </p:cSld>
-  <p:clrMapOvr>
-    <a:masterClrMapping/>
-  </p:clrMapOvr>
-</p:sld>
-</file>
-
-<file path=ppt/slides/slide13.xml><?xml version="1.0" encoding="utf-8"?>
-<p:sld xmlns:a="http://schemas.openxmlformats.org/drawingml/2006/main" xmlns:r="http://schemas.openxmlformats.org/officeDocument/2006/relationships" xmlns:p="http://schemas.openxmlformats.org/presentationml/2006/main">
-  <p:cSld>
-    <p:spTree>
-      <p:nvGrpSpPr>
-        <p:cNvPr id="1" name=""/>
-        <p:cNvGrpSpPr/>
-        <p:nvPr/>
-      </p:nvGrpSpPr>
-      <p:grpSpPr>
-        <a:xfrm>
-          <a:off x="0" y="0"/>
-          <a:ext cx="0" cy="0"/>
-          <a:chOff x="0" y="0"/>
-          <a:chExt cx="0" cy="0"/>
-        </a:xfrm>
-      </p:grpSpPr>
-      <p:sp>
-        <p:nvSpPr>
-          <p:cNvPr id="3" name="Rubrik 2">
-            <a:extLst>
-              <a:ext uri="{FF2B5EF4-FFF2-40B4-BE49-F238E27FC236}">
-                <a16:creationId xmlns:a16="http://schemas.microsoft.com/office/drawing/2014/main" id="{2D1C7B31-1DCC-4890-A9D7-00CE7145799B}"/>
-              </a:ext>
-            </a:extLst>
-          </p:cNvPr>
-          <p:cNvSpPr>
-            <a:spLocks noGrp="1"/>
-          </p:cNvSpPr>
-          <p:nvPr>
-            <p:ph type="title"/>
-          </p:nvPr>
-        </p:nvSpPr>
-        <p:spPr/>
-        <p:txBody>
-          <a:bodyPr/>
-          <a:lstStyle/>
-          <a:p>
-            <a:r>
-              <a:rPr lang="sv-SE" dirty="0" err="1"/>
-              <a:t>Statistics</a:t>
-            </a:r>
-            <a:r>
-              <a:rPr lang="sv-SE" dirty="0"/>
-              <a:t> histogram</a:t>
-            </a:r>
-          </a:p>
-        </p:txBody>
-      </p:sp>
-      <p:graphicFrame>
-        <p:nvGraphicFramePr>
-          <p:cNvPr id="7" name="Tabell 7">
-            <a:extLst>
-              <a:ext uri="{FF2B5EF4-FFF2-40B4-BE49-F238E27FC236}">
-                <a16:creationId xmlns:a16="http://schemas.microsoft.com/office/drawing/2014/main" id="{5F322064-2FE7-4441-874A-91342A24D98D}"/>
-              </a:ext>
-            </a:extLst>
-          </p:cNvPr>
-          <p:cNvGraphicFramePr>
-            <a:graphicFrameLocks noGrp="1"/>
-          </p:cNvGraphicFramePr>
-          <p:nvPr>
-            <p:ph idx="1"/>
-          </p:nvPr>
-        </p:nvGraphicFramePr>
-        <p:xfrm>
-          <a:off x="381368" y="1523844"/>
-          <a:ext cx="11429260" cy="3096637"/>
-        </p:xfrm>
-        <a:graphic>
-          <a:graphicData uri="http://schemas.openxmlformats.org/drawingml/2006/table">
-            <a:tbl>
-              <a:tblPr firstRow="1" bandRow="1">
-                <a:tableStyleId>{5C22544A-7EE6-4342-B048-85BDC9FD1C3A}</a:tableStyleId>
-              </a:tblPr>
-              <a:tblGrid>
-                <a:gridCol w="2285852">
-                  <a:extLst>
-                    <a:ext uri="{9D8B030D-6E8A-4147-A177-3AD203B41FA5}">
-                      <a16:colId xmlns:a16="http://schemas.microsoft.com/office/drawing/2014/main" val="1128465952"/>
-                    </a:ext>
-                  </a:extLst>
-                </a:gridCol>
-                <a:gridCol w="2285852">
-                  <a:extLst>
-                    <a:ext uri="{9D8B030D-6E8A-4147-A177-3AD203B41FA5}">
-                      <a16:colId xmlns:a16="http://schemas.microsoft.com/office/drawing/2014/main" val="1167298882"/>
-                    </a:ext>
-                  </a:extLst>
-                </a:gridCol>
-                <a:gridCol w="2285852">
-                  <a:extLst>
-                    <a:ext uri="{9D8B030D-6E8A-4147-A177-3AD203B41FA5}">
-                      <a16:colId xmlns:a16="http://schemas.microsoft.com/office/drawing/2014/main" val="2008461237"/>
-                    </a:ext>
-                  </a:extLst>
-                </a:gridCol>
-                <a:gridCol w="2285852">
-                  <a:extLst>
-                    <a:ext uri="{9D8B030D-6E8A-4147-A177-3AD203B41FA5}">
-                      <a16:colId xmlns:a16="http://schemas.microsoft.com/office/drawing/2014/main" val="3545740637"/>
-                    </a:ext>
-                  </a:extLst>
-                </a:gridCol>
-                <a:gridCol w="2285852">
-                  <a:extLst>
-                    <a:ext uri="{9D8B030D-6E8A-4147-A177-3AD203B41FA5}">
-                      <a16:colId xmlns:a16="http://schemas.microsoft.com/office/drawing/2014/main" val="3684419405"/>
-                    </a:ext>
-                  </a:extLst>
-                </a:gridCol>
-              </a:tblGrid>
-              <a:tr h="677389">
-                <a:tc>
-                  <a:txBody>
-                    <a:bodyPr/>
-                    <a:lstStyle/>
-                    <a:p>
-                      <a:r>
-                        <a:rPr lang="sv-SE" sz="1900" dirty="0"/>
-                        <a:t>RANGE_HI_KEY</a:t>
-                      </a:r>
-                    </a:p>
-                  </a:txBody>
-                  <a:tcPr marL="96770" marR="96770" marT="48385" marB="48385"/>
-                </a:tc>
-                <a:tc>
-                  <a:txBody>
-                    <a:bodyPr/>
-                    <a:lstStyle/>
-                    <a:p>
-                      <a:r>
-                        <a:rPr lang="sv-SE" sz="1900" dirty="0"/>
-                        <a:t>RANGE_ROWS</a:t>
-                      </a:r>
-                    </a:p>
-                  </a:txBody>
-                  <a:tcPr marL="96770" marR="96770" marT="48385" marB="48385"/>
-                </a:tc>
-                <a:tc>
-                  <a:txBody>
-                    <a:bodyPr/>
-                    <a:lstStyle/>
-                    <a:p>
-                      <a:r>
-                        <a:rPr lang="sv-SE" sz="1900" dirty="0"/>
-                        <a:t>EQ_ROWS</a:t>
-                      </a:r>
-                    </a:p>
-                  </a:txBody>
-                  <a:tcPr marL="96770" marR="96770" marT="48385" marB="48385"/>
-                </a:tc>
-                <a:tc>
-                  <a:txBody>
-                    <a:bodyPr/>
-                    <a:lstStyle/>
-                    <a:p>
-                      <a:r>
-                        <a:rPr lang="sv-SE" sz="1900" dirty="0"/>
-                        <a:t>DISTINCT_RANGE_ROWS</a:t>
-                      </a:r>
-                    </a:p>
-                  </a:txBody>
-                  <a:tcPr marL="96770" marR="96770" marT="48385" marB="48385"/>
-                </a:tc>
-                <a:tc>
-                  <a:txBody>
-                    <a:bodyPr/>
-                    <a:lstStyle/>
-                    <a:p>
-                      <a:r>
-                        <a:rPr lang="sv-SE" sz="1900" dirty="0"/>
-                        <a:t>AVG_RANGE_ROWS</a:t>
-                      </a:r>
-                    </a:p>
-                  </a:txBody>
-                  <a:tcPr marL="96770" marR="96770" marT="48385" marB="48385"/>
-                </a:tc>
-                <a:extLst>
-                  <a:ext uri="{0D108BD9-81ED-4DB2-BD59-A6C34878D82A}">
-                    <a16:rowId xmlns:a16="http://schemas.microsoft.com/office/drawing/2014/main" val="1937687347"/>
-                  </a:ext>
-                </a:extLst>
-              </a:tr>
-              <a:tr h="2419248">
-                <a:tc>
-                  <a:txBody>
-                    <a:bodyPr/>
-                    <a:lstStyle/>
-                    <a:p>
-                      <a:r>
-                        <a:rPr lang="sv-SE" sz="1900" dirty="0" err="1"/>
-                        <a:t>Upper</a:t>
-                      </a:r>
-                      <a:r>
-                        <a:rPr lang="sv-SE" sz="1900" dirty="0"/>
-                        <a:t> limit </a:t>
-                      </a:r>
-                      <a:r>
-                        <a:rPr lang="sv-SE" sz="1900" dirty="0" err="1"/>
-                        <a:t>of</a:t>
-                      </a:r>
-                      <a:r>
-                        <a:rPr lang="sv-SE" sz="1900" dirty="0"/>
-                        <a:t> a </a:t>
-                      </a:r>
-                      <a:r>
-                        <a:rPr lang="sv-SE" sz="1900" dirty="0" err="1"/>
-                        <a:t>bucket</a:t>
-                      </a:r>
-                      <a:r>
-                        <a:rPr lang="sv-SE" sz="1900" dirty="0"/>
-                        <a:t> (</a:t>
-                      </a:r>
-                      <a:r>
-                        <a:rPr lang="sv-SE" sz="1900" dirty="0" err="1"/>
-                        <a:t>sqlvariant</a:t>
-                      </a:r>
-                      <a:r>
-                        <a:rPr lang="sv-SE" sz="1900" dirty="0"/>
-                        <a:t>). A </a:t>
-                      </a:r>
-                      <a:r>
-                        <a:rPr lang="sv-SE" sz="1900" dirty="0" err="1"/>
-                        <a:t>distinct</a:t>
-                      </a:r>
-                      <a:r>
-                        <a:rPr lang="sv-SE" sz="1900" dirty="0"/>
-                        <a:t> </a:t>
-                      </a:r>
-                      <a:r>
-                        <a:rPr lang="sv-SE" sz="1900" dirty="0" err="1"/>
-                        <a:t>value</a:t>
-                      </a:r>
-                      <a:r>
-                        <a:rPr lang="sv-SE" sz="1900" dirty="0"/>
-                        <a:t> from the leading </a:t>
-                      </a:r>
-                      <a:r>
-                        <a:rPr lang="sv-SE" sz="1900" dirty="0" err="1"/>
-                        <a:t>column</a:t>
-                      </a:r>
-                      <a:r>
-                        <a:rPr lang="sv-SE" sz="1900" dirty="0"/>
-                        <a:t> in the index/</a:t>
-                      </a:r>
-                      <a:r>
-                        <a:rPr lang="sv-SE" sz="1900" dirty="0" err="1"/>
-                        <a:t>statistics</a:t>
-                      </a:r>
-                      <a:r>
-                        <a:rPr lang="sv-SE" sz="1900" dirty="0"/>
-                        <a:t> </a:t>
-                      </a:r>
-                      <a:r>
-                        <a:rPr lang="sv-SE" sz="1900" dirty="0" err="1"/>
-                        <a:t>object</a:t>
-                      </a:r>
-                      <a:r>
-                        <a:rPr lang="sv-SE" sz="1900" dirty="0"/>
-                        <a:t>.</a:t>
-                      </a:r>
-                    </a:p>
-                  </a:txBody>
-                  <a:tcPr marL="96770" marR="96770" marT="48385" marB="48385"/>
-                </a:tc>
-                <a:tc>
-                  <a:txBody>
-                    <a:bodyPr/>
-                    <a:lstStyle/>
-                    <a:p>
-                      <a:r>
-                        <a:rPr lang="sv-SE" sz="1900" dirty="0" err="1"/>
-                        <a:t>Number</a:t>
-                      </a:r>
-                      <a:r>
-                        <a:rPr lang="sv-SE" sz="1900" dirty="0"/>
-                        <a:t> </a:t>
-                      </a:r>
-                      <a:r>
-                        <a:rPr lang="sv-SE" sz="1900" dirty="0" err="1"/>
-                        <a:t>of</a:t>
-                      </a:r>
-                      <a:r>
-                        <a:rPr lang="sv-SE" sz="1900" dirty="0"/>
-                        <a:t> </a:t>
-                      </a:r>
-                      <a:r>
-                        <a:rPr lang="sv-SE" sz="1900" dirty="0" err="1"/>
-                        <a:t>rows</a:t>
-                      </a:r>
-                      <a:r>
-                        <a:rPr lang="sv-SE" sz="1900" dirty="0"/>
-                        <a:t> in the </a:t>
-                      </a:r>
-                      <a:r>
-                        <a:rPr lang="sv-SE" sz="1900" dirty="0" err="1"/>
-                        <a:t>bucket</a:t>
-                      </a:r>
-                      <a:r>
-                        <a:rPr lang="sv-SE" sz="1900" dirty="0"/>
-                        <a:t>, </a:t>
-                      </a:r>
-                      <a:r>
-                        <a:rPr lang="sv-SE" sz="1900" dirty="0" err="1"/>
-                        <a:t>smaller</a:t>
-                      </a:r>
-                      <a:r>
-                        <a:rPr lang="sv-SE" sz="1900" dirty="0"/>
-                        <a:t>/</a:t>
-                      </a:r>
-                      <a:r>
-                        <a:rPr lang="sv-SE" sz="1900" dirty="0" err="1"/>
-                        <a:t>lower</a:t>
-                      </a:r>
-                      <a:r>
-                        <a:rPr lang="sv-SE" sz="1900" dirty="0"/>
-                        <a:t> than the </a:t>
-                      </a:r>
-                      <a:r>
-                        <a:rPr lang="sv-SE" sz="1900" dirty="0" err="1"/>
-                        <a:t>value</a:t>
-                      </a:r>
-                      <a:r>
-                        <a:rPr lang="sv-SE" sz="1900" dirty="0"/>
-                        <a:t> </a:t>
-                      </a:r>
-                      <a:r>
-                        <a:rPr lang="sv-SE" sz="1900" dirty="0" err="1"/>
-                        <a:t>of</a:t>
-                      </a:r>
-                      <a:r>
-                        <a:rPr lang="sv-SE" sz="1900" dirty="0"/>
-                        <a:t> RANGE_HI_KEY</a:t>
-                      </a:r>
-                    </a:p>
-                  </a:txBody>
-                  <a:tcPr marL="96770" marR="96770" marT="48385" marB="48385"/>
-                </a:tc>
-                <a:tc>
-                  <a:txBody>
-                    <a:bodyPr/>
-                    <a:lstStyle/>
-                    <a:p>
-                      <a:r>
-                        <a:rPr lang="sv-SE" sz="1900" dirty="0" err="1"/>
-                        <a:t>Number</a:t>
-                      </a:r>
-                      <a:r>
-                        <a:rPr lang="sv-SE" sz="1900" dirty="0"/>
-                        <a:t> </a:t>
-                      </a:r>
-                      <a:r>
-                        <a:rPr lang="sv-SE" sz="1900" dirty="0" err="1"/>
-                        <a:t>of</a:t>
-                      </a:r>
-                      <a:r>
-                        <a:rPr lang="sv-SE" sz="1900" dirty="0"/>
-                        <a:t> </a:t>
-                      </a:r>
-                      <a:r>
-                        <a:rPr lang="sv-SE" sz="1900" dirty="0" err="1"/>
-                        <a:t>rows</a:t>
-                      </a:r>
-                      <a:r>
-                        <a:rPr lang="sv-SE" sz="1900" dirty="0"/>
-                        <a:t> in the </a:t>
-                      </a:r>
-                      <a:r>
-                        <a:rPr lang="sv-SE" sz="1900" dirty="0" err="1"/>
-                        <a:t>bucket</a:t>
-                      </a:r>
-                      <a:r>
-                        <a:rPr lang="sv-SE" sz="1900" dirty="0"/>
-                        <a:t> with </a:t>
-                      </a:r>
-                      <a:r>
-                        <a:rPr lang="sv-SE" sz="1900" dirty="0" err="1"/>
-                        <a:t>value</a:t>
-                      </a:r>
-                      <a:r>
-                        <a:rPr lang="sv-SE" sz="1900" dirty="0"/>
-                        <a:t> </a:t>
-                      </a:r>
-                      <a:r>
-                        <a:rPr lang="sv-SE" sz="1900" dirty="0" err="1"/>
-                        <a:t>exactly</a:t>
-                      </a:r>
-                      <a:r>
-                        <a:rPr lang="sv-SE" sz="1900" dirty="0"/>
-                        <a:t> RANGE_HI_KEY</a:t>
-                      </a:r>
-                    </a:p>
-                  </a:txBody>
-                  <a:tcPr marL="96770" marR="96770" marT="48385" marB="48385"/>
-                </a:tc>
-                <a:tc>
-                  <a:txBody>
-                    <a:bodyPr/>
-                    <a:lstStyle/>
-                    <a:p>
-                      <a:r>
-                        <a:rPr lang="sv-SE" sz="1900" dirty="0" err="1"/>
-                        <a:t>Number</a:t>
-                      </a:r>
-                      <a:r>
-                        <a:rPr lang="sv-SE" sz="1900" dirty="0"/>
-                        <a:t> </a:t>
-                      </a:r>
-                      <a:r>
-                        <a:rPr lang="sv-SE" sz="1900" dirty="0" err="1"/>
-                        <a:t>of</a:t>
-                      </a:r>
-                      <a:r>
-                        <a:rPr lang="sv-SE" sz="1900" dirty="0"/>
-                        <a:t> </a:t>
-                      </a:r>
-                      <a:r>
-                        <a:rPr lang="sv-SE" sz="1900" dirty="0" err="1"/>
-                        <a:t>unique</a:t>
-                      </a:r>
-                      <a:r>
-                        <a:rPr lang="sv-SE" sz="1900" dirty="0"/>
-                        <a:t> </a:t>
-                      </a:r>
-                      <a:r>
-                        <a:rPr lang="sv-SE" sz="1900" dirty="0" err="1"/>
-                        <a:t>values</a:t>
-                      </a:r>
-                      <a:r>
-                        <a:rPr lang="sv-SE" sz="1900" dirty="0"/>
-                        <a:t> for the leading </a:t>
-                      </a:r>
-                      <a:r>
-                        <a:rPr lang="sv-SE" sz="1900" dirty="0" err="1"/>
-                        <a:t>column</a:t>
-                      </a:r>
-                      <a:r>
-                        <a:rPr lang="sv-SE" sz="1900" dirty="0"/>
-                        <a:t> </a:t>
-                      </a:r>
-                      <a:r>
-                        <a:rPr lang="sv-SE" sz="1900" dirty="0" err="1"/>
-                        <a:t>of</a:t>
-                      </a:r>
-                      <a:r>
-                        <a:rPr lang="sv-SE" sz="1900" dirty="0"/>
-                        <a:t> the index/</a:t>
-                      </a:r>
-                      <a:r>
-                        <a:rPr lang="sv-SE" sz="1900" dirty="0" err="1"/>
-                        <a:t>statistics</a:t>
-                      </a:r>
-                      <a:r>
-                        <a:rPr lang="sv-SE" sz="1900" dirty="0"/>
-                        <a:t> </a:t>
-                      </a:r>
-                      <a:r>
-                        <a:rPr lang="sv-SE" sz="1900" dirty="0" err="1"/>
-                        <a:t>object</a:t>
-                      </a:r>
-                      <a:r>
-                        <a:rPr lang="sv-SE" sz="1900" dirty="0"/>
-                        <a:t> in the </a:t>
-                      </a:r>
-                      <a:r>
-                        <a:rPr lang="sv-SE" sz="1900" dirty="0" err="1"/>
-                        <a:t>bucket</a:t>
-                      </a:r>
-                      <a:endParaRPr lang="sv-SE" sz="1900" dirty="0"/>
-                    </a:p>
-                  </a:txBody>
-                  <a:tcPr marL="96770" marR="96770" marT="48385" marB="48385"/>
-                </a:tc>
-                <a:tc>
-                  <a:txBody>
-                    <a:bodyPr/>
-                    <a:lstStyle/>
-                    <a:p>
-                      <a:r>
-                        <a:rPr lang="sv-SE" sz="1900" dirty="0" err="1"/>
-                        <a:t>Average</a:t>
-                      </a:r>
-                      <a:r>
-                        <a:rPr lang="sv-SE" sz="1900" dirty="0"/>
-                        <a:t> </a:t>
-                      </a:r>
-                      <a:r>
-                        <a:rPr lang="sv-SE" sz="1900" dirty="0" err="1"/>
-                        <a:t>rows</a:t>
-                      </a:r>
-                      <a:r>
-                        <a:rPr lang="sv-SE" sz="1900" dirty="0"/>
-                        <a:t> per </a:t>
-                      </a:r>
-                      <a:r>
-                        <a:rPr lang="sv-SE" sz="1900" dirty="0" err="1"/>
-                        <a:t>distinct</a:t>
-                      </a:r>
-                      <a:r>
-                        <a:rPr lang="sv-SE" sz="1900" dirty="0"/>
-                        <a:t> </a:t>
-                      </a:r>
-                      <a:r>
-                        <a:rPr lang="sv-SE" sz="1900" dirty="0" err="1"/>
-                        <a:t>value</a:t>
-                      </a:r>
-                      <a:r>
-                        <a:rPr lang="sv-SE" sz="1900" dirty="0"/>
-                        <a:t> </a:t>
-                      </a:r>
-                      <a:r>
-                        <a:rPr lang="sv-SE" sz="1900" dirty="0" err="1"/>
-                        <a:t>within</a:t>
-                      </a:r>
-                      <a:r>
-                        <a:rPr lang="sv-SE" sz="1900" dirty="0"/>
-                        <a:t> the </a:t>
-                      </a:r>
-                      <a:r>
-                        <a:rPr lang="sv-SE" sz="1900" dirty="0" err="1"/>
-                        <a:t>bucket</a:t>
-                      </a:r>
-                      <a:endParaRPr lang="sv-SE" sz="1900" dirty="0"/>
-                    </a:p>
-                  </a:txBody>
-                  <a:tcPr marL="96770" marR="96770" marT="48385" marB="48385"/>
-                </a:tc>
-                <a:extLst>
-                  <a:ext uri="{0D108BD9-81ED-4DB2-BD59-A6C34878D82A}">
-                    <a16:rowId xmlns:a16="http://schemas.microsoft.com/office/drawing/2014/main" val="2174196647"/>
-                  </a:ext>
-                </a:extLst>
-              </a:tr>
-            </a:tbl>
-          </a:graphicData>
-        </a:graphic>
-      </p:graphicFrame>
-    </p:spTree>
-    <p:extLst>
-      <p:ext uri="{BB962C8B-B14F-4D97-AF65-F5344CB8AC3E}">
-        <p14:creationId xmlns:p14="http://schemas.microsoft.com/office/powerpoint/2010/main" val="692552160"/>
-      </p:ext>
-    </p:extLst>
-  </p:cSld>
-  <p:clrMapOvr>
-    <a:masterClrMapping/>
-  </p:clrMapOvr>
-</p:sld>
-</file>
-
-<file path=ppt/slides/slide14.xml><?xml version="1.0" encoding="utf-8"?>
-<p:sld xmlns:a="http://schemas.openxmlformats.org/drawingml/2006/main" xmlns:r="http://schemas.openxmlformats.org/officeDocument/2006/relationships" xmlns:p="http://schemas.openxmlformats.org/presentationml/2006/main">
-  <p:cSld>
-    <p:spTree>
-      <p:nvGrpSpPr>
-        <p:cNvPr id="1" name=""/>
-        <p:cNvGrpSpPr/>
-        <p:nvPr/>
-      </p:nvGrpSpPr>
-      <p:grpSpPr>
-        <a:xfrm>
-          <a:off x="0" y="0"/>
-          <a:ext cx="0" cy="0"/>
-          <a:chOff x="0" y="0"/>
-          <a:chExt cx="0" cy="0"/>
-        </a:xfrm>
-      </p:grpSpPr>
-      <p:sp>
-        <p:nvSpPr>
-          <p:cNvPr id="2" name="Rubrik 1">
-            <a:extLst>
-              <a:ext uri="{FF2B5EF4-FFF2-40B4-BE49-F238E27FC236}">
-                <a16:creationId xmlns:a16="http://schemas.microsoft.com/office/drawing/2014/main" id="{C19E3114-3B34-4DC6-9954-7932D53A5647}"/>
-              </a:ext>
-            </a:extLst>
-          </p:cNvPr>
-          <p:cNvSpPr>
-            <a:spLocks noGrp="1"/>
-          </p:cNvSpPr>
-          <p:nvPr>
-            <p:ph type="title"/>
-          </p:nvPr>
-        </p:nvSpPr>
-        <p:spPr/>
-        <p:txBody>
-          <a:bodyPr/>
-          <a:lstStyle/>
-          <a:p>
-            <a:r>
-              <a:rPr lang="sv-SE" dirty="0" err="1"/>
-              <a:t>Density</a:t>
-            </a:r>
-            <a:r>
-              <a:rPr lang="sv-SE" dirty="0"/>
-              <a:t> </a:t>
-            </a:r>
-            <a:r>
-              <a:rPr lang="sv-SE" dirty="0" err="1"/>
-              <a:t>vector</a:t>
-            </a:r>
-            <a:endParaRPr lang="sv-SE" dirty="0"/>
-          </a:p>
-        </p:txBody>
-      </p:sp>
-      <p:sp>
-        <p:nvSpPr>
-          <p:cNvPr id="3" name="Platshållare för innehåll 2">
-            <a:extLst>
-              <a:ext uri="{FF2B5EF4-FFF2-40B4-BE49-F238E27FC236}">
-                <a16:creationId xmlns:a16="http://schemas.microsoft.com/office/drawing/2014/main" id="{85E5DAEB-E3E2-4AE6-A57C-F36BCBFB4B31}"/>
-              </a:ext>
-            </a:extLst>
-          </p:cNvPr>
-          <p:cNvSpPr>
-            <a:spLocks noGrp="1"/>
-          </p:cNvSpPr>
-          <p:nvPr>
-            <p:ph idx="1"/>
-          </p:nvPr>
-        </p:nvSpPr>
-        <p:spPr/>
-        <p:txBody>
-          <a:bodyPr/>
-          <a:lstStyle/>
-          <a:p>
-            <a:r>
-              <a:rPr lang="sv-SE" dirty="0" err="1"/>
-              <a:t>Density</a:t>
-            </a:r>
-            <a:r>
-              <a:rPr lang="sv-SE" dirty="0"/>
-              <a:t> </a:t>
-            </a:r>
-            <a:r>
-              <a:rPr lang="sv-SE" dirty="0" err="1"/>
-              <a:t>of</a:t>
-            </a:r>
-            <a:r>
-              <a:rPr lang="sv-SE" dirty="0"/>
-              <a:t> leading </a:t>
-            </a:r>
-            <a:r>
-              <a:rPr lang="sv-SE" dirty="0" err="1"/>
-              <a:t>column</a:t>
-            </a:r>
-            <a:r>
-              <a:rPr lang="sv-SE" dirty="0"/>
-              <a:t>, </a:t>
-            </a:r>
-            <a:r>
-              <a:rPr lang="sv-SE" dirty="0" err="1"/>
-              <a:t>then</a:t>
-            </a:r>
-            <a:r>
-              <a:rPr lang="sv-SE" dirty="0"/>
-              <a:t> </a:t>
-            </a:r>
-            <a:r>
-              <a:rPr lang="sv-SE" dirty="0" err="1"/>
-              <a:t>two</a:t>
-            </a:r>
-            <a:r>
-              <a:rPr lang="sv-SE" dirty="0"/>
-              <a:t> leading </a:t>
-            </a:r>
-            <a:r>
-              <a:rPr lang="sv-SE" dirty="0" err="1"/>
-              <a:t>columns</a:t>
-            </a:r>
-            <a:r>
-              <a:rPr lang="sv-SE" dirty="0"/>
-              <a:t> in combination, </a:t>
-            </a:r>
-            <a:r>
-              <a:rPr lang="sv-SE" dirty="0" err="1"/>
-              <a:t>then</a:t>
-            </a:r>
-            <a:r>
-              <a:rPr lang="sv-SE" dirty="0"/>
-              <a:t> </a:t>
-            </a:r>
-            <a:r>
-              <a:rPr lang="sv-SE" dirty="0" err="1"/>
-              <a:t>three</a:t>
-            </a:r>
-            <a:r>
-              <a:rPr lang="sv-SE" dirty="0"/>
-              <a:t> leading </a:t>
-            </a:r>
-            <a:r>
-              <a:rPr lang="sv-SE" dirty="0" err="1"/>
-              <a:t>columns</a:t>
-            </a:r>
-            <a:r>
-              <a:rPr lang="sv-SE" dirty="0"/>
-              <a:t>…</a:t>
-            </a:r>
-          </a:p>
-          <a:p>
-            <a:r>
-              <a:rPr lang="sv-SE" dirty="0" err="1"/>
-              <a:t>Density</a:t>
-            </a:r>
-            <a:r>
-              <a:rPr lang="sv-SE" dirty="0"/>
-              <a:t> = </a:t>
-            </a:r>
-            <a:r>
-              <a:rPr lang="sv-SE" dirty="0" err="1"/>
-              <a:t>NoDistinctValues</a:t>
-            </a:r>
-            <a:r>
-              <a:rPr lang="sv-SE" dirty="0"/>
-              <a:t> / </a:t>
-            </a:r>
-            <a:r>
-              <a:rPr lang="sv-SE" dirty="0" err="1"/>
-              <a:t>NoRows</a:t>
-            </a:r>
-            <a:endParaRPr lang="sv-SE" dirty="0"/>
-          </a:p>
-          <a:p>
-            <a:r>
-              <a:rPr lang="sv-SE" dirty="0"/>
-              <a:t>Gender = </a:t>
-            </a:r>
-            <a:r>
-              <a:rPr lang="sv-SE" dirty="0" err="1"/>
-              <a:t>High</a:t>
-            </a:r>
-            <a:r>
-              <a:rPr lang="sv-SE" dirty="0"/>
-              <a:t> </a:t>
-            </a:r>
-            <a:r>
-              <a:rPr lang="sv-SE" dirty="0" err="1"/>
-              <a:t>density</a:t>
-            </a:r>
-            <a:r>
-              <a:rPr lang="sv-SE" dirty="0"/>
-              <a:t>, SSN = </a:t>
-            </a:r>
-            <a:r>
-              <a:rPr lang="sv-SE" dirty="0" err="1"/>
-              <a:t>Low</a:t>
-            </a:r>
-            <a:r>
-              <a:rPr lang="sv-SE" dirty="0"/>
-              <a:t> </a:t>
-            </a:r>
-            <a:r>
-              <a:rPr lang="sv-SE" dirty="0" err="1"/>
-              <a:t>density</a:t>
-            </a:r>
-            <a:endParaRPr lang="sv-SE" dirty="0"/>
-          </a:p>
-          <a:p>
-            <a:r>
-              <a:rPr lang="sv-SE" dirty="0" err="1"/>
-              <a:t>Low</a:t>
-            </a:r>
-            <a:r>
-              <a:rPr lang="sv-SE" dirty="0"/>
-              <a:t> </a:t>
-            </a:r>
-            <a:r>
-              <a:rPr lang="sv-SE" dirty="0" err="1"/>
-              <a:t>Selectivity</a:t>
-            </a:r>
-            <a:r>
-              <a:rPr lang="sv-SE" dirty="0"/>
-              <a:t> = </a:t>
-            </a:r>
-            <a:r>
-              <a:rPr lang="sv-SE" dirty="0" err="1"/>
-              <a:t>High</a:t>
-            </a:r>
-            <a:r>
-              <a:rPr lang="sv-SE" dirty="0"/>
-              <a:t> </a:t>
-            </a:r>
-            <a:r>
-              <a:rPr lang="sv-SE" dirty="0" err="1"/>
-              <a:t>Density</a:t>
-            </a:r>
-            <a:endParaRPr lang="sv-SE" dirty="0"/>
-          </a:p>
-        </p:txBody>
-      </p:sp>
-    </p:spTree>
-    <p:extLst>
-      <p:ext uri="{BB962C8B-B14F-4D97-AF65-F5344CB8AC3E}">
-        <p14:creationId xmlns:p14="http://schemas.microsoft.com/office/powerpoint/2010/main" val="1430289838"/>
-      </p:ext>
-    </p:extLst>
-  </p:cSld>
-  <p:clrMapOvr>
-    <a:masterClrMapping/>
-  </p:clrMapOvr>
-</p:sld>
-</file>
-
-<file path=ppt/slides/slide15.xml><?xml version="1.0" encoding="utf-8"?>
-<p:sld xmlns:a="http://schemas.openxmlformats.org/drawingml/2006/main" xmlns:r="http://schemas.openxmlformats.org/officeDocument/2006/relationships" xmlns:p="http://schemas.openxmlformats.org/presentationml/2006/main">
-  <p:cSld>
-    <p:spTree>
-      <p:nvGrpSpPr>
-        <p:cNvPr id="1" name=""/>
-        <p:cNvGrpSpPr/>
-        <p:nvPr/>
-      </p:nvGrpSpPr>
-      <p:grpSpPr>
-        <a:xfrm>
-          <a:off x="0" y="0"/>
-          <a:ext cx="0" cy="0"/>
-          <a:chOff x="0" y="0"/>
-          <a:chExt cx="0" cy="0"/>
-        </a:xfrm>
-      </p:grpSpPr>
-      <p:sp>
-        <p:nvSpPr>
-          <p:cNvPr id="2" name="Rubrik 1">
-            <a:extLst>
-              <a:ext uri="{FF2B5EF4-FFF2-40B4-BE49-F238E27FC236}">
-                <a16:creationId xmlns:a16="http://schemas.microsoft.com/office/drawing/2014/main" id="{BD47827A-DD6C-49BB-AF64-42F14CE85D2B}"/>
-              </a:ext>
-            </a:extLst>
-          </p:cNvPr>
-          <p:cNvSpPr>
-            <a:spLocks noGrp="1"/>
-          </p:cNvSpPr>
-          <p:nvPr>
-            <p:ph type="title"/>
-          </p:nvPr>
-        </p:nvSpPr>
-        <p:spPr/>
-        <p:txBody>
-          <a:bodyPr/>
-          <a:lstStyle/>
-          <a:p>
-            <a:r>
-              <a:rPr lang="sv-SE" dirty="0" err="1"/>
-              <a:t>Ascending</a:t>
-            </a:r>
-            <a:r>
-              <a:rPr lang="sv-SE" dirty="0"/>
-              <a:t> </a:t>
-            </a:r>
-            <a:r>
-              <a:rPr lang="sv-SE" dirty="0" err="1"/>
-              <a:t>Key</a:t>
-            </a:r>
-            <a:r>
-              <a:rPr lang="sv-SE" dirty="0"/>
-              <a:t> Problem</a:t>
-            </a:r>
-          </a:p>
-        </p:txBody>
-      </p:sp>
-      <p:sp>
-        <p:nvSpPr>
-          <p:cNvPr id="4" name="Platshållare för innehåll 3">
-            <a:extLst>
-              <a:ext uri="{FF2B5EF4-FFF2-40B4-BE49-F238E27FC236}">
-                <a16:creationId xmlns:a16="http://schemas.microsoft.com/office/drawing/2014/main" id="{C95A51E3-8B67-40B8-8F94-C3A3B8A5D65E}"/>
-              </a:ext>
-            </a:extLst>
-          </p:cNvPr>
-          <p:cNvSpPr>
-            <a:spLocks noGrp="1"/>
-          </p:cNvSpPr>
-          <p:nvPr>
-            <p:ph idx="1"/>
-          </p:nvPr>
-        </p:nvSpPr>
-        <p:spPr/>
-        <p:txBody>
-          <a:bodyPr/>
-          <a:lstStyle/>
-          <a:p>
-            <a:r>
-              <a:rPr lang="sv-SE" dirty="0" err="1"/>
-              <a:t>Can</a:t>
-            </a:r>
-            <a:r>
-              <a:rPr lang="sv-SE" dirty="0"/>
-              <a:t> </a:t>
-            </a:r>
-            <a:r>
-              <a:rPr lang="sv-SE" dirty="0" err="1"/>
-              <a:t>also</a:t>
-            </a:r>
-            <a:r>
-              <a:rPr lang="sv-SE" dirty="0"/>
-              <a:t> be </a:t>
-            </a:r>
-            <a:r>
-              <a:rPr lang="sv-SE" dirty="0" err="1"/>
-              <a:t>missing</a:t>
-            </a:r>
-            <a:r>
-              <a:rPr lang="sv-SE" dirty="0"/>
-              <a:t> </a:t>
-            </a:r>
-            <a:r>
-              <a:rPr lang="sv-SE" dirty="0" err="1"/>
-              <a:t>key</a:t>
-            </a:r>
-            <a:r>
-              <a:rPr lang="sv-SE" dirty="0"/>
-              <a:t>-in-the-</a:t>
-            </a:r>
-            <a:r>
-              <a:rPr lang="sv-SE" dirty="0" err="1"/>
-              <a:t>middle</a:t>
-            </a:r>
-            <a:r>
-              <a:rPr lang="sv-SE" dirty="0"/>
-              <a:t> problem</a:t>
-            </a:r>
-          </a:p>
-        </p:txBody>
-      </p:sp>
-    </p:spTree>
-    <p:extLst>
-      <p:ext uri="{BB962C8B-B14F-4D97-AF65-F5344CB8AC3E}">
-        <p14:creationId xmlns:p14="http://schemas.microsoft.com/office/powerpoint/2010/main" val="1330220207"/>
-      </p:ext>
-    </p:extLst>
-  </p:cSld>
-  <p:clrMapOvr>
-    <a:masterClrMapping/>
-  </p:clrMapOvr>
-</p:sld>
-</file>
-
-<file path=ppt/slides/slide16.xml><?xml version="1.0" encoding="utf-8"?>
-<p:sld xmlns:a="http://schemas.openxmlformats.org/drawingml/2006/main" xmlns:r="http://schemas.openxmlformats.org/officeDocument/2006/relationships" xmlns:p="http://schemas.openxmlformats.org/presentationml/2006/main">
-  <p:cSld>
-    <p:spTree>
-      <p:nvGrpSpPr>
-        <p:cNvPr id="1" name=""/>
-        <p:cNvGrpSpPr/>
-        <p:nvPr/>
-      </p:nvGrpSpPr>
-      <p:grpSpPr>
-        <a:xfrm>
-          <a:off x="0" y="0"/>
-          <a:ext cx="0" cy="0"/>
-          <a:chOff x="0" y="0"/>
-          <a:chExt cx="0" cy="0"/>
-        </a:xfrm>
-      </p:grpSpPr>
-      <p:sp>
-        <p:nvSpPr>
-          <p:cNvPr id="2" name="Rubrik 1">
-            <a:extLst>
-              <a:ext uri="{FF2B5EF4-FFF2-40B4-BE49-F238E27FC236}">
-                <a16:creationId xmlns:a16="http://schemas.microsoft.com/office/drawing/2014/main" id="{5F3681B5-1BA8-4FD2-9088-5C0A26C117E3}"/>
-              </a:ext>
-            </a:extLst>
-          </p:cNvPr>
-          <p:cNvSpPr>
-            <a:spLocks noGrp="1"/>
-          </p:cNvSpPr>
-          <p:nvPr>
-            <p:ph type="ctrTitle"/>
-          </p:nvPr>
-        </p:nvSpPr>
-        <p:spPr/>
-        <p:txBody>
-          <a:bodyPr/>
-          <a:lstStyle/>
-          <a:p>
-            <a:r>
-              <a:rPr lang="sv-SE" dirty="0"/>
-              <a:t>Suggestions?</a:t>
-            </a:r>
-          </a:p>
-        </p:txBody>
-      </p:sp>
-    </p:spTree>
-    <p:extLst>
-      <p:ext uri="{BB962C8B-B14F-4D97-AF65-F5344CB8AC3E}">
-        <p14:creationId xmlns:p14="http://schemas.microsoft.com/office/powerpoint/2010/main" val="4081507761"/>
-      </p:ext>
-    </p:extLst>
-  </p:cSld>
-  <p:clrMapOvr>
-    <a:masterClrMapping/>
-  </p:clrMapOvr>
-</p:sld>
-</file>
-
-<file path=ppt/slides/slide17.xml><?xml version="1.0" encoding="utf-8"?>
-<p:sld xmlns:a="http://schemas.openxmlformats.org/drawingml/2006/main" xmlns:r="http://schemas.openxmlformats.org/officeDocument/2006/relationships" xmlns:p="http://schemas.openxmlformats.org/presentationml/2006/main">
-  <p:cSld>
-    <p:spTree>
-      <p:nvGrpSpPr>
-        <p:cNvPr id="1" name=""/>
-        <p:cNvGrpSpPr/>
-        <p:nvPr/>
-      </p:nvGrpSpPr>
-      <p:grpSpPr>
-        <a:xfrm>
-          <a:off x="0" y="0"/>
-          <a:ext cx="0" cy="0"/>
-          <a:chOff x="0" y="0"/>
-          <a:chExt cx="0" cy="0"/>
-        </a:xfrm>
-      </p:grpSpPr>
-      <p:sp>
-        <p:nvSpPr>
-          <p:cNvPr id="4" name="Rubrik 3">
-            <a:extLst>
-              <a:ext uri="{FF2B5EF4-FFF2-40B4-BE49-F238E27FC236}">
-                <a16:creationId xmlns:a16="http://schemas.microsoft.com/office/drawing/2014/main" id="{64B64222-BACF-4B17-BDCE-188BE068A840}"/>
-              </a:ext>
-            </a:extLst>
-          </p:cNvPr>
-          <p:cNvSpPr>
-            <a:spLocks noGrp="1"/>
-          </p:cNvSpPr>
-          <p:nvPr>
-            <p:ph type="ctrTitle"/>
-          </p:nvPr>
-        </p:nvSpPr>
-        <p:spPr/>
-        <p:txBody>
-          <a:bodyPr/>
-          <a:lstStyle/>
-          <a:p>
-            <a:r>
-              <a:rPr lang="sv-SE" dirty="0" err="1"/>
-              <a:t>Let’s</a:t>
-            </a:r>
-            <a:r>
-              <a:rPr lang="sv-SE" dirty="0"/>
-              <a:t> try to fix it</a:t>
-            </a:r>
-          </a:p>
-        </p:txBody>
-      </p:sp>
-      <p:sp>
-        <p:nvSpPr>
-          <p:cNvPr id="5" name="Underrubrik 4">
-            <a:extLst>
-              <a:ext uri="{FF2B5EF4-FFF2-40B4-BE49-F238E27FC236}">
-                <a16:creationId xmlns:a16="http://schemas.microsoft.com/office/drawing/2014/main" id="{41E7AB13-09F7-4E15-892F-5AFF12D2FA76}"/>
-              </a:ext>
-            </a:extLst>
-          </p:cNvPr>
-          <p:cNvSpPr>
-            <a:spLocks noGrp="1"/>
-          </p:cNvSpPr>
-          <p:nvPr>
-            <p:ph type="subTitle" idx="1"/>
-          </p:nvPr>
-        </p:nvSpPr>
-        <p:spPr/>
-        <p:txBody>
-          <a:bodyPr/>
-          <a:lstStyle/>
-          <a:p>
-            <a:r>
-              <a:rPr lang="sv-SE" dirty="0"/>
-              <a:t>DEMO</a:t>
-            </a:r>
-          </a:p>
-        </p:txBody>
-      </p:sp>
-    </p:spTree>
-    <p:extLst>
-      <p:ext uri="{BB962C8B-B14F-4D97-AF65-F5344CB8AC3E}">
-        <p14:creationId xmlns:p14="http://schemas.microsoft.com/office/powerpoint/2010/main" val="2097935439"/>
-      </p:ext>
-    </p:extLst>
-  </p:cSld>
-  <p:clrMapOvr>
-    <a:masterClrMapping/>
-  </p:clrMapOvr>
-</p:sld>
-</file>
-
-<file path=ppt/slides/slide18.xml><?xml version="1.0" encoding="utf-8"?>
-<p:sld xmlns:a="http://schemas.openxmlformats.org/drawingml/2006/main" xmlns:r="http://schemas.openxmlformats.org/officeDocument/2006/relationships" xmlns:p="http://schemas.openxmlformats.org/presentationml/2006/main">
-  <p:cSld>
-    <p:spTree>
-      <p:nvGrpSpPr>
-        <p:cNvPr id="1" name=""/>
-        <p:cNvGrpSpPr/>
-        <p:nvPr/>
-      </p:nvGrpSpPr>
-      <p:grpSpPr>
-        <a:xfrm>
-          <a:off x="0" y="0"/>
-          <a:ext cx="0" cy="0"/>
-          <a:chOff x="0" y="0"/>
-          <a:chExt cx="0" cy="0"/>
-        </a:xfrm>
-      </p:grpSpPr>
-      <p:sp>
-        <p:nvSpPr>
-          <p:cNvPr id="4" name="Rubrik 3">
-            <a:extLst>
-              <a:ext uri="{FF2B5EF4-FFF2-40B4-BE49-F238E27FC236}">
-                <a16:creationId xmlns:a16="http://schemas.microsoft.com/office/drawing/2014/main" id="{F08205C7-0C61-429A-AA9C-1E9A4FBFFB77}"/>
-              </a:ext>
-            </a:extLst>
-          </p:cNvPr>
-          <p:cNvSpPr>
-            <a:spLocks noGrp="1"/>
-          </p:cNvSpPr>
-          <p:nvPr>
-            <p:ph type="ctrTitle"/>
-          </p:nvPr>
-        </p:nvSpPr>
-        <p:spPr/>
-        <p:txBody>
-          <a:bodyPr/>
-          <a:lstStyle/>
-          <a:p>
-            <a:r>
-              <a:rPr lang="sv-SE" dirty="0"/>
-              <a:t>Is there a silver </a:t>
-            </a:r>
-            <a:r>
-              <a:rPr lang="sv-SE" dirty="0" err="1"/>
-              <a:t>bullet</a:t>
-            </a:r>
-            <a:r>
-              <a:rPr lang="sv-SE" dirty="0"/>
-              <a:t>?</a:t>
-            </a:r>
-          </a:p>
-        </p:txBody>
-      </p:sp>
-      <p:sp>
-        <p:nvSpPr>
-          <p:cNvPr id="5" name="Underrubrik 4">
-            <a:extLst>
-              <a:ext uri="{FF2B5EF4-FFF2-40B4-BE49-F238E27FC236}">
-                <a16:creationId xmlns:a16="http://schemas.microsoft.com/office/drawing/2014/main" id="{D85E6EFA-AF2A-4B3D-A597-053A70AC0E34}"/>
-              </a:ext>
-            </a:extLst>
-          </p:cNvPr>
-          <p:cNvSpPr>
-            <a:spLocks noGrp="1"/>
-          </p:cNvSpPr>
-          <p:nvPr>
-            <p:ph type="subTitle" idx="1"/>
-          </p:nvPr>
-        </p:nvSpPr>
-        <p:spPr/>
-        <p:txBody>
-          <a:bodyPr/>
-          <a:lstStyle/>
-          <a:p>
-            <a:r>
-              <a:rPr lang="sv-SE" dirty="0"/>
-              <a:t>…or is it ”It </a:t>
-            </a:r>
-            <a:r>
-              <a:rPr lang="sv-SE" dirty="0" err="1"/>
-              <a:t>depends</a:t>
-            </a:r>
-            <a:r>
-              <a:rPr lang="sv-SE" dirty="0"/>
-              <a:t>”?</a:t>
-            </a:r>
-          </a:p>
-        </p:txBody>
-      </p:sp>
-    </p:spTree>
-    <p:extLst>
-      <p:ext uri="{BB962C8B-B14F-4D97-AF65-F5344CB8AC3E}">
-        <p14:creationId xmlns:p14="http://schemas.microsoft.com/office/powerpoint/2010/main" val="947879144"/>
+        <p14:creationId xmlns:p14="http://schemas.microsoft.com/office/powerpoint/2010/main" val="4103121024"/>
       </p:ext>
     </p:extLst>
   </p:cSld>
@@ -11592,7 +10097,7 @@
         <p:spPr/>
         <p:txBody>
           <a:bodyPr>
-            <a:normAutofit/>
+            <a:normAutofit fontScale="92500" lnSpcReduction="10000"/>
           </a:bodyPr>
           <a:lstStyle/>
           <a:p>
@@ -11604,21 +10109,76 @@
           <a:p>
             <a:r>
               <a:rPr lang="sv-SE" dirty="0"/>
-              <a:t>Transmokopter SQL AB – </a:t>
-            </a:r>
-            <a:r>
-              <a:rPr lang="sv-SE" dirty="0" err="1"/>
-              <a:t>database</a:t>
-            </a:r>
-            <a:r>
-              <a:rPr lang="sv-SE" dirty="0"/>
-              <a:t> </a:t>
+              <a:t>Transmokopter SQL AB – database </a:t>
             </a:r>
             <a:r>
               <a:rPr lang="sv-SE" dirty="0" err="1"/>
               <a:t>consultant</a:t>
             </a:r>
             <a:endParaRPr lang="sv-SE" dirty="0"/>
+          </a:p>
+          <a:p>
+            <a:r>
+              <a:rPr lang="sv-SE" dirty="0"/>
+              <a:t>Community speaker, Community </a:t>
+            </a:r>
+            <a:r>
+              <a:rPr lang="sv-SE" dirty="0" err="1"/>
+              <a:t>organizer</a:t>
+            </a:r>
+            <a:endParaRPr lang="sv-SE" dirty="0"/>
+          </a:p>
+          <a:p>
+            <a:pPr lvl="1"/>
+            <a:r>
+              <a:rPr lang="sv-SE" dirty="0"/>
+              <a:t>#</a:t>
+            </a:r>
+            <a:r>
+              <a:rPr lang="sv-SE" dirty="0" err="1"/>
+              <a:t>DataWeekender</a:t>
+            </a:r>
+            <a:r>
+              <a:rPr lang="sv-SE" dirty="0"/>
+              <a:t> May 2nd </a:t>
+            </a:r>
+            <a:br>
+              <a:rPr lang="sv-SE" dirty="0"/>
+            </a:br>
+            <a:r>
+              <a:rPr lang="sv-SE" dirty="0"/>
+              <a:t>Call for speakers: https://sessionize.com/data-community-weekender-europe/</a:t>
+            </a:r>
+            <a:br>
+              <a:rPr lang="sv-SE" dirty="0"/>
+            </a:br>
+            <a:r>
+              <a:rPr lang="sv-SE" dirty="0" err="1"/>
+              <a:t>Follow</a:t>
+            </a:r>
+            <a:r>
+              <a:rPr lang="sv-SE" dirty="0"/>
+              <a:t> @</a:t>
+            </a:r>
+            <a:r>
+              <a:rPr lang="sv-SE" dirty="0" err="1"/>
+              <a:t>DataWeekender</a:t>
+            </a:r>
+            <a:r>
+              <a:rPr lang="sv-SE" dirty="0"/>
+              <a:t> on Twitter</a:t>
+            </a:r>
+            <a:br>
+              <a:rPr lang="sv-SE" dirty="0"/>
+            </a:br>
+            <a:r>
+              <a:rPr lang="sv-SE" dirty="0" err="1"/>
+              <a:t>Meetup</a:t>
+            </a:r>
+            <a:r>
+              <a:rPr lang="sv-SE" dirty="0"/>
+              <a:t>: https://www.meetup.com/Data-Community-Weekender-Europe/events/269951016/</a:t>
+            </a:r>
           </a:p>
           <a:p>
             <a:r>
@@ -11741,7 +10301,7 @@
         </p:blipFill>
         <p:spPr>
           <a:xfrm>
-            <a:off x="2753727" y="3772434"/>
+            <a:off x="2753727" y="4920590"/>
             <a:ext cx="328541" cy="328541"/>
           </a:xfrm>
           <a:prstGeom prst="rect">
@@ -11763,7 +10323,7 @@
         </p:nvSpPr>
         <p:spPr>
           <a:xfrm>
-            <a:off x="3082268" y="3821288"/>
+            <a:off x="3082268" y="4969444"/>
             <a:ext cx="2777952" cy="230832"/>
           </a:xfrm>
           <a:prstGeom prst="rect">
@@ -11923,15 +10483,7 @@
           <a:p>
             <a:r>
               <a:rPr lang="sv-SE" dirty="0"/>
-              <a:t>Restore </a:t>
-            </a:r>
-            <a:r>
-              <a:rPr lang="sv-SE" dirty="0" err="1"/>
-              <a:t>testing</a:t>
-            </a:r>
-            <a:r>
-              <a:rPr lang="sv-SE" dirty="0"/>
-              <a:t> with </a:t>
+              <a:t>Migration – log shipping and more with </a:t>
             </a:r>
             <a:r>
               <a:rPr lang="sv-SE" dirty="0" err="1"/>
@@ -11940,14 +10492,6 @@
             <a:endParaRPr lang="sv-SE" dirty="0"/>
           </a:p>
           <a:p>
-            <a:r>
-              <a:rPr lang="sv-SE" dirty="0"/>
-              <a:t>Migration – log shipping and more with </a:t>
-            </a:r>
-            <a:r>
-              <a:rPr lang="sv-SE" dirty="0" err="1"/>
-              <a:t>DBATools</a:t>
-            </a:r>
             <a:endParaRPr lang="sv-SE" dirty="0"/>
           </a:p>
         </p:txBody>
@@ -13093,10 +11637,10 @@
       </p:grpSpPr>
       <p:sp>
         <p:nvSpPr>
-          <p:cNvPr id="4" name="Rubrik 3">
+          <p:cNvPr id="2" name="Rubrik 1">
             <a:extLst>
               <a:ext uri="{FF2B5EF4-FFF2-40B4-BE49-F238E27FC236}">
-                <a16:creationId xmlns:a16="http://schemas.microsoft.com/office/drawing/2014/main" id="{B815B6F0-441C-4C91-AB08-6E805A1963BC}"/>
+                <a16:creationId xmlns:a16="http://schemas.microsoft.com/office/drawing/2014/main" id="{B27421CA-D06E-432D-BBB0-72002BD27D88}"/>
               </a:ext>
             </a:extLst>
           </p:cNvPr>
@@ -13104,7 +11648,7 @@
             <a:spLocks noGrp="1"/>
           </p:cNvSpPr>
           <p:nvPr>
-            <p:ph type="ctrTitle"/>
+            <p:ph type="title"/>
           </p:nvPr>
         </p:nvSpPr>
         <p:spPr/>
@@ -13114,15 +11658,164 @@
           <a:p>
             <a:r>
               <a:rPr lang="sv-SE" dirty="0"/>
-              <a:t>DBATOOLS</a:t>
-            </a:r>
+              <a:t>What is </a:t>
+            </a:r>
+            <a:r>
+              <a:rPr lang="sv-SE" dirty="0" err="1"/>
+              <a:t>DBATools</a:t>
+            </a:r>
+            <a:endParaRPr lang="sv-SE" dirty="0"/>
+          </a:p>
+        </p:txBody>
+      </p:sp>
+      <p:sp>
+        <p:nvSpPr>
+          <p:cNvPr id="3" name="Platshållare för innehåll 2">
+            <a:extLst>
+              <a:ext uri="{FF2B5EF4-FFF2-40B4-BE49-F238E27FC236}">
+                <a16:creationId xmlns:a16="http://schemas.microsoft.com/office/drawing/2014/main" id="{E0DC4934-1C7B-4A0E-8FD1-E96F78641DBF}"/>
+              </a:ext>
+            </a:extLst>
+          </p:cNvPr>
+          <p:cNvSpPr>
+            <a:spLocks noGrp="1"/>
+          </p:cNvSpPr>
+          <p:nvPr>
+            <p:ph idx="1"/>
+          </p:nvPr>
+        </p:nvSpPr>
+        <p:spPr/>
+        <p:txBody>
+          <a:bodyPr/>
+          <a:lstStyle/>
+          <a:p>
+            <a:r>
+              <a:rPr lang="sv-SE" dirty="0"/>
+              <a:t>Powershell </a:t>
+            </a:r>
+            <a:r>
+              <a:rPr lang="sv-SE" dirty="0" err="1"/>
+              <a:t>module</a:t>
+            </a:r>
+            <a:endParaRPr lang="sv-SE" dirty="0"/>
+          </a:p>
+          <a:p>
+            <a:r>
+              <a:rPr lang="sv-SE" dirty="0" err="1"/>
+              <a:t>Available</a:t>
+            </a:r>
+            <a:r>
+              <a:rPr lang="sv-SE" dirty="0"/>
+              <a:t> on </a:t>
+            </a:r>
+            <a:r>
+              <a:rPr lang="sv-SE" dirty="0" err="1"/>
+              <a:t>PowershellGallery</a:t>
+            </a:r>
+            <a:endParaRPr lang="sv-SE" dirty="0"/>
+          </a:p>
+          <a:p>
+            <a:r>
+              <a:rPr lang="sv-SE" dirty="0" err="1"/>
+              <a:t>Command</a:t>
+            </a:r>
+            <a:r>
+              <a:rPr lang="sv-SE" dirty="0"/>
+              <a:t> </a:t>
+            </a:r>
+            <a:r>
+              <a:rPr lang="sv-SE" dirty="0" err="1"/>
+              <a:t>reference</a:t>
+            </a:r>
+            <a:r>
+              <a:rPr lang="sv-SE" dirty="0"/>
+              <a:t> on dbatools.io/</a:t>
+            </a:r>
+            <a:r>
+              <a:rPr lang="sv-SE" dirty="0" err="1"/>
+              <a:t>commands</a:t>
+            </a:r>
+            <a:endParaRPr lang="sv-SE" dirty="0"/>
+          </a:p>
+          <a:p>
+            <a:r>
+              <a:rPr lang="sv-SE" dirty="0"/>
+              <a:t>Community driven</a:t>
+            </a:r>
+          </a:p>
+          <a:p>
+            <a:pPr lvl="1"/>
+            <a:r>
+              <a:rPr lang="sv-SE" dirty="0"/>
+              <a:t>Use it</a:t>
+            </a:r>
+          </a:p>
+          <a:p>
+            <a:pPr lvl="1"/>
+            <a:r>
+              <a:rPr lang="sv-SE" dirty="0" err="1"/>
+              <a:t>Contribute</a:t>
+            </a:r>
+            <a:endParaRPr lang="sv-SE" dirty="0"/>
+          </a:p>
+          <a:p>
+            <a:pPr lvl="2"/>
+            <a:r>
+              <a:rPr lang="sv-SE" dirty="0" err="1"/>
+              <a:t>Write</a:t>
+            </a:r>
+            <a:r>
+              <a:rPr lang="sv-SE" dirty="0"/>
+              <a:t> code</a:t>
+            </a:r>
+          </a:p>
+          <a:p>
+            <a:pPr lvl="2"/>
+            <a:r>
+              <a:rPr lang="sv-SE" dirty="0" err="1"/>
+              <a:t>Report</a:t>
+            </a:r>
+            <a:r>
+              <a:rPr lang="sv-SE" dirty="0"/>
+              <a:t> </a:t>
+            </a:r>
+            <a:r>
+              <a:rPr lang="sv-SE" dirty="0" err="1"/>
+              <a:t>bugs</a:t>
+            </a:r>
+            <a:endParaRPr lang="sv-SE" dirty="0"/>
+          </a:p>
+          <a:p>
+            <a:pPr lvl="2"/>
+            <a:r>
+              <a:rPr lang="sv-SE" dirty="0" err="1"/>
+              <a:t>Suggest</a:t>
+            </a:r>
+            <a:r>
+              <a:rPr lang="sv-SE" dirty="0"/>
+              <a:t> features</a:t>
+            </a:r>
+          </a:p>
+          <a:p>
+            <a:pPr lvl="1"/>
+            <a:r>
+              <a:rPr lang="sv-SE" dirty="0" err="1"/>
+              <a:t>Donate</a:t>
+            </a:r>
+            <a:r>
+              <a:rPr lang="sv-SE" dirty="0"/>
+              <a:t> $$$</a:t>
+            </a:r>
+          </a:p>
+          <a:p>
+            <a:endParaRPr lang="sv-SE" dirty="0"/>
           </a:p>
         </p:txBody>
       </p:sp>
     </p:spTree>
     <p:extLst>
       <p:ext uri="{BB962C8B-B14F-4D97-AF65-F5344CB8AC3E}">
-        <p14:creationId xmlns:p14="http://schemas.microsoft.com/office/powerpoint/2010/main" val="3531482130"/>
+        <p14:creationId xmlns:p14="http://schemas.microsoft.com/office/powerpoint/2010/main" val="290540475"/>
       </p:ext>
     </p:extLst>
   </p:cSld>
@@ -14110,18 +12803,18 @@
 </file>
 
 <file path=customXml/item2.xml><?xml version="1.0" encoding="utf-8"?>
-<p:properties xmlns:p="http://schemas.microsoft.com/office/2006/metadata/properties" xmlns:xsi="http://www.w3.org/2001/XMLSchema-instance" xmlns:pc="http://schemas.microsoft.com/office/infopath/2007/PartnerControls">
-  <documentManagement/>
-</p:properties>
-</file>
-
-<file path=customXml/item3.xml><?xml version="1.0" encoding="utf-8"?>
 <?mso-contentType ?>
 <FormTemplates xmlns="http://schemas.microsoft.com/sharepoint/v3/contenttype/forms">
   <Display>DocumentLibraryForm</Display>
   <Edit>DocumentLibraryForm</Edit>
   <New>DocumentLibraryForm</New>
 </FormTemplates>
+</file>
+
+<file path=customXml/item3.xml><?xml version="1.0" encoding="utf-8"?>
+<p:properties xmlns:p="http://schemas.microsoft.com/office/2006/metadata/properties" xmlns:xsi="http://www.w3.org/2001/XMLSchema-instance" xmlns:pc="http://schemas.microsoft.com/office/infopath/2007/PartnerControls">
+  <documentManagement/>
+</p:properties>
 </file>
 
 <file path=customXml/itemProps1.xml><?xml version="1.0" encoding="utf-8"?>
@@ -14143,18 +12836,18 @@
 </file>
 
 <file path=customXml/itemProps2.xml><?xml version="1.0" encoding="utf-8"?>
+<ds:datastoreItem xmlns:ds="http://schemas.openxmlformats.org/officeDocument/2006/customXml" ds:itemID="{C542A527-91EE-49D6-AF42-393E29B98637}">
+  <ds:schemaRefs>
+    <ds:schemaRef ds:uri="http://schemas.microsoft.com/sharepoint/v3/contenttype/forms"/>
+  </ds:schemaRefs>
+</ds:datastoreItem>
+</file>
+
+<file path=customXml/itemProps3.xml><?xml version="1.0" encoding="utf-8"?>
 <ds:datastoreItem xmlns:ds="http://schemas.openxmlformats.org/officeDocument/2006/customXml" ds:itemID="{A5AA9653-386D-4377-A986-DC4A02C60CD5}">
   <ds:schemaRefs>
     <ds:schemaRef ds:uri="http://schemas.microsoft.com/office/2006/metadata/properties"/>
     <ds:schemaRef ds:uri="http://schemas.microsoft.com/office/infopath/2007/PartnerControls"/>
   </ds:schemaRefs>
 </ds:datastoreItem>
-</file>
-
-<file path=customXml/itemProps3.xml><?xml version="1.0" encoding="utf-8"?>
-<ds:datastoreItem xmlns:ds="http://schemas.openxmlformats.org/officeDocument/2006/customXml" ds:itemID="{C542A527-91EE-49D6-AF42-393E29B98637}">
-  <ds:schemaRefs>
-    <ds:schemaRef ds:uri="http://schemas.microsoft.com/sharepoint/v3/contenttype/forms"/>
-  </ds:schemaRefs>
-</ds:datastoreItem>
 </file>
</xml_diff>

<commit_message>
After GroupBy, with fixes
</commit_message>
<xml_diff>
--- a/ILoveDBATools/ILoveDBATools.pptx
+++ b/ILoveDBATools/ILoveDBATools.pptx
@@ -11417,7 +11417,16 @@
             </a:r>
             <a:r>
               <a:rPr lang="sv-SE" dirty="0"/>
-              <a:t>. That you </a:t>
+              <a:t>. </a:t>
+            </a:r>
+          </a:p>
+          <a:p>
+            <a:pPr marL="0" indent="0">
+              <a:buNone/>
+            </a:pPr>
+            <a:r>
+              <a:rPr lang="sv-SE" dirty="0"/>
+              <a:t>That you </a:t>
             </a:r>
             <a:r>
               <a:rPr lang="sv-SE" dirty="0" err="1"/>
@@ -11432,10 +11441,9 @@
               <a:t>once</a:t>
             </a:r>
             <a:r>
-              <a:rPr lang="sv-SE"/>
+              <a:rPr lang="sv-SE" dirty="0"/>
               <a:t>.</a:t>
             </a:r>
-            <a:endParaRPr lang="sv-SE" dirty="0"/>
           </a:p>
           <a:p>
             <a:endParaRPr lang="sv-SE" dirty="0"/>
@@ -11455,6 +11463,85 @@
   <p:clrMapOvr>
     <a:masterClrMapping/>
   </p:clrMapOvr>
+  <p:timing>
+    <p:tnLst>
+      <p:par>
+        <p:cTn id="1" dur="indefinite" restart="never" nodeType="tmRoot">
+          <p:childTnLst>
+            <p:seq concurrent="1" nextAc="seek">
+              <p:cTn id="2" dur="indefinite" nodeType="mainSeq">
+                <p:childTnLst>
+                  <p:par>
+                    <p:cTn id="3" fill="hold">
+                      <p:stCondLst>
+                        <p:cond delay="indefinite"/>
+                      </p:stCondLst>
+                      <p:childTnLst>
+                        <p:par>
+                          <p:cTn id="4" fill="hold">
+                            <p:stCondLst>
+                              <p:cond delay="0"/>
+                            </p:stCondLst>
+                            <p:childTnLst>
+                              <p:par>
+                                <p:cTn id="5" presetID="1" presetClass="entr" presetSubtype="0" fill="hold" nodeType="clickEffect">
+                                  <p:stCondLst>
+                                    <p:cond delay="0"/>
+                                  </p:stCondLst>
+                                  <p:childTnLst>
+                                    <p:set>
+                                      <p:cBhvr>
+                                        <p:cTn id="6" dur="1" fill="hold">
+                                          <p:stCondLst>
+                                            <p:cond delay="0"/>
+                                          </p:stCondLst>
+                                        </p:cTn>
+                                        <p:tgtEl>
+                                          <p:spTgt spid="3">
+                                            <p:txEl>
+                                              <p:pRg st="5" end="5"/>
+                                            </p:txEl>
+                                          </p:spTgt>
+                                        </p:tgtEl>
+                                        <p:attrNameLst>
+                                          <p:attrName>style.visibility</p:attrName>
+                                        </p:attrNameLst>
+                                      </p:cBhvr>
+                                      <p:to>
+                                        <p:strVal val="visible"/>
+                                      </p:to>
+                                    </p:set>
+                                  </p:childTnLst>
+                                </p:cTn>
+                              </p:par>
+                            </p:childTnLst>
+                          </p:cTn>
+                        </p:par>
+                      </p:childTnLst>
+                    </p:cTn>
+                  </p:par>
+                </p:childTnLst>
+              </p:cTn>
+              <p:prevCondLst>
+                <p:cond evt="onPrev" delay="0">
+                  <p:tgtEl>
+                    <p:sldTgt/>
+                  </p:tgtEl>
+                </p:cond>
+              </p:prevCondLst>
+              <p:nextCondLst>
+                <p:cond evt="onNext" delay="0">
+                  <p:tgtEl>
+                    <p:sldTgt/>
+                  </p:tgtEl>
+                </p:cond>
+              </p:nextCondLst>
+            </p:seq>
+          </p:childTnLst>
+        </p:cTn>
+      </p:par>
+    </p:tnLst>
+  </p:timing>
 </p:sld>
 </file>
 

</xml_diff>